<commit_message>
Revise partial trust figure. Use theorem/proof format.
</commit_message>
<xml_diff>
--- a/fig/Alice_trusted_neigh2.pptx
+++ b/fig/Alice_trusted_neigh2.pptx
@@ -7,14 +7,14 @@
   <p:sldIdLst>
     <p:sldId id="256" r:id="rId2"/>
   </p:sldIdLst>
-  <p:sldSz cx="9144000" cy="6858000" type="screen4x3"/>
+  <p:sldSz cx="8229600" cy="5715000"/>
   <p:notesSz cx="6858000" cy="9144000"/>
   <p:defaultTextStyle>
     <a:defPPr>
       <a:defRPr lang="en-US"/>
     </a:defPPr>
-    <a:lvl1pPr marL="0" algn="l" defTabSz="457200" rtl="0" eaLnBrk="1" latinLnBrk="0" hangingPunct="1">
-      <a:defRPr sz="1800" kern="1200">
+    <a:lvl1pPr marL="0" algn="l" defTabSz="415595" rtl="0" eaLnBrk="1" latinLnBrk="0" hangingPunct="1">
+      <a:defRPr sz="1600" kern="1200">
         <a:solidFill>
           <a:schemeClr val="tx1"/>
         </a:solidFill>
@@ -23,8 +23,8 @@
         <a:cs typeface="+mn-cs"/>
       </a:defRPr>
     </a:lvl1pPr>
-    <a:lvl2pPr marL="457200" algn="l" defTabSz="457200" rtl="0" eaLnBrk="1" latinLnBrk="0" hangingPunct="1">
-      <a:defRPr sz="1800" kern="1200">
+    <a:lvl2pPr marL="415595" algn="l" defTabSz="415595" rtl="0" eaLnBrk="1" latinLnBrk="0" hangingPunct="1">
+      <a:defRPr sz="1600" kern="1200">
         <a:solidFill>
           <a:schemeClr val="tx1"/>
         </a:solidFill>
@@ -33,8 +33,8 @@
         <a:cs typeface="+mn-cs"/>
       </a:defRPr>
     </a:lvl2pPr>
-    <a:lvl3pPr marL="914400" algn="l" defTabSz="457200" rtl="0" eaLnBrk="1" latinLnBrk="0" hangingPunct="1">
-      <a:defRPr sz="1800" kern="1200">
+    <a:lvl3pPr marL="831190" algn="l" defTabSz="415595" rtl="0" eaLnBrk="1" latinLnBrk="0" hangingPunct="1">
+      <a:defRPr sz="1600" kern="1200">
         <a:solidFill>
           <a:schemeClr val="tx1"/>
         </a:solidFill>
@@ -43,8 +43,8 @@
         <a:cs typeface="+mn-cs"/>
       </a:defRPr>
     </a:lvl3pPr>
-    <a:lvl4pPr marL="1371600" algn="l" defTabSz="457200" rtl="0" eaLnBrk="1" latinLnBrk="0" hangingPunct="1">
-      <a:defRPr sz="1800" kern="1200">
+    <a:lvl4pPr marL="1246784" algn="l" defTabSz="415595" rtl="0" eaLnBrk="1" latinLnBrk="0" hangingPunct="1">
+      <a:defRPr sz="1600" kern="1200">
         <a:solidFill>
           <a:schemeClr val="tx1"/>
         </a:solidFill>
@@ -53,8 +53,8 @@
         <a:cs typeface="+mn-cs"/>
       </a:defRPr>
     </a:lvl4pPr>
-    <a:lvl5pPr marL="1828800" algn="l" defTabSz="457200" rtl="0" eaLnBrk="1" latinLnBrk="0" hangingPunct="1">
-      <a:defRPr sz="1800" kern="1200">
+    <a:lvl5pPr marL="1662379" algn="l" defTabSz="415595" rtl="0" eaLnBrk="1" latinLnBrk="0" hangingPunct="1">
+      <a:defRPr sz="1600" kern="1200">
         <a:solidFill>
           <a:schemeClr val="tx1"/>
         </a:solidFill>
@@ -63,8 +63,8 @@
         <a:cs typeface="+mn-cs"/>
       </a:defRPr>
     </a:lvl5pPr>
-    <a:lvl6pPr marL="2286000" algn="l" defTabSz="457200" rtl="0" eaLnBrk="1" latinLnBrk="0" hangingPunct="1">
-      <a:defRPr sz="1800" kern="1200">
+    <a:lvl6pPr marL="2077974" algn="l" defTabSz="415595" rtl="0" eaLnBrk="1" latinLnBrk="0" hangingPunct="1">
+      <a:defRPr sz="1600" kern="1200">
         <a:solidFill>
           <a:schemeClr val="tx1"/>
         </a:solidFill>
@@ -73,8 +73,8 @@
         <a:cs typeface="+mn-cs"/>
       </a:defRPr>
     </a:lvl6pPr>
-    <a:lvl7pPr marL="2743200" algn="l" defTabSz="457200" rtl="0" eaLnBrk="1" latinLnBrk="0" hangingPunct="1">
-      <a:defRPr sz="1800" kern="1200">
+    <a:lvl7pPr marL="2493569" algn="l" defTabSz="415595" rtl="0" eaLnBrk="1" latinLnBrk="0" hangingPunct="1">
+      <a:defRPr sz="1600" kern="1200">
         <a:solidFill>
           <a:schemeClr val="tx1"/>
         </a:solidFill>
@@ -83,8 +83,8 @@
         <a:cs typeface="+mn-cs"/>
       </a:defRPr>
     </a:lvl7pPr>
-    <a:lvl8pPr marL="3200400" algn="l" defTabSz="457200" rtl="0" eaLnBrk="1" latinLnBrk="0" hangingPunct="1">
-      <a:defRPr sz="1800" kern="1200">
+    <a:lvl8pPr marL="2909164" algn="l" defTabSz="415595" rtl="0" eaLnBrk="1" latinLnBrk="0" hangingPunct="1">
+      <a:defRPr sz="1600" kern="1200">
         <a:solidFill>
           <a:schemeClr val="tx1"/>
         </a:solidFill>
@@ -93,8 +93,8 @@
         <a:cs typeface="+mn-cs"/>
       </a:defRPr>
     </a:lvl8pPr>
-    <a:lvl9pPr marL="3657600" algn="l" defTabSz="457200" rtl="0" eaLnBrk="1" latinLnBrk="0" hangingPunct="1">
-      <a:defRPr sz="1800" kern="1200">
+    <a:lvl9pPr marL="3324758" algn="l" defTabSz="415595" rtl="0" eaLnBrk="1" latinLnBrk="0" hangingPunct="1">
+      <a:defRPr sz="1600" kern="1200">
         <a:solidFill>
           <a:schemeClr val="tx1"/>
         </a:solidFill>
@@ -136,8 +136,8 @@
         </p:nvSpPr>
         <p:spPr>
           <a:xfrm>
-            <a:off x="685800" y="2130425"/>
-            <a:ext cx="7772400" cy="1470025"/>
+            <a:off x="617220" y="1775355"/>
+            <a:ext cx="6995160" cy="1225021"/>
           </a:xfrm>
         </p:spPr>
         <p:txBody>
@@ -164,8 +164,8 @@
         </p:nvSpPr>
         <p:spPr>
           <a:xfrm>
-            <a:off x="1371600" y="3886200"/>
-            <a:ext cx="6400800" cy="1752600"/>
+            <a:off x="1234440" y="3238500"/>
+            <a:ext cx="5760720" cy="1460500"/>
           </a:xfrm>
         </p:spPr>
         <p:txBody>
@@ -181,7 +181,7 @@
                 </a:solidFill>
               </a:defRPr>
             </a:lvl1pPr>
-            <a:lvl2pPr marL="457200" indent="0" algn="ctr">
+            <a:lvl2pPr marL="415595" indent="0" algn="ctr">
               <a:buNone/>
               <a:defRPr>
                 <a:solidFill>
@@ -191,7 +191,7 @@
                 </a:solidFill>
               </a:defRPr>
             </a:lvl2pPr>
-            <a:lvl3pPr marL="914400" indent="0" algn="ctr">
+            <a:lvl3pPr marL="831190" indent="0" algn="ctr">
               <a:buNone/>
               <a:defRPr>
                 <a:solidFill>
@@ -201,7 +201,7 @@
                 </a:solidFill>
               </a:defRPr>
             </a:lvl3pPr>
-            <a:lvl4pPr marL="1371600" indent="0" algn="ctr">
+            <a:lvl4pPr marL="1246784" indent="0" algn="ctr">
               <a:buNone/>
               <a:defRPr>
                 <a:solidFill>
@@ -211,7 +211,7 @@
                 </a:solidFill>
               </a:defRPr>
             </a:lvl4pPr>
-            <a:lvl5pPr marL="1828800" indent="0" algn="ctr">
+            <a:lvl5pPr marL="1662379" indent="0" algn="ctr">
               <a:buNone/>
               <a:defRPr>
                 <a:solidFill>
@@ -221,7 +221,7 @@
                 </a:solidFill>
               </a:defRPr>
             </a:lvl5pPr>
-            <a:lvl6pPr marL="2286000" indent="0" algn="ctr">
+            <a:lvl6pPr marL="2077974" indent="0" algn="ctr">
               <a:buNone/>
               <a:defRPr>
                 <a:solidFill>
@@ -231,7 +231,7 @@
                 </a:solidFill>
               </a:defRPr>
             </a:lvl6pPr>
-            <a:lvl7pPr marL="2743200" indent="0" algn="ctr">
+            <a:lvl7pPr marL="2493569" indent="0" algn="ctr">
               <a:buNone/>
               <a:defRPr>
                 <a:solidFill>
@@ -241,7 +241,7 @@
                 </a:solidFill>
               </a:defRPr>
             </a:lvl7pPr>
-            <a:lvl8pPr marL="3200400" indent="0" algn="ctr">
+            <a:lvl8pPr marL="2909164" indent="0" algn="ctr">
               <a:buNone/>
               <a:defRPr>
                 <a:solidFill>
@@ -251,7 +251,7 @@
                 </a:solidFill>
               </a:defRPr>
             </a:lvl8pPr>
-            <a:lvl9pPr marL="3657600" indent="0" algn="ctr">
+            <a:lvl9pPr marL="3324758" indent="0" algn="ctr">
               <a:buNone/>
               <a:defRPr>
                 <a:solidFill>
@@ -288,7 +288,7 @@
           <a:p>
             <a:fld id="{A0480C7D-7A79-264F-B28F-B634F7C2F632}" type="datetimeFigureOut">
               <a:rPr lang="en-US" smtClean="0"/>
-              <a:t>5/5/16</a:t>
+              <a:t>8/7/16</a:t>
             </a:fld>
             <a:endParaRPr lang="en-US"/>
           </a:p>
@@ -458,7 +458,7 @@
           <a:p>
             <a:fld id="{A0480C7D-7A79-264F-B28F-B634F7C2F632}" type="datetimeFigureOut">
               <a:rPr lang="en-US" smtClean="0"/>
-              <a:t>5/5/16</a:t>
+              <a:t>8/7/16</a:t>
             </a:fld>
             <a:endParaRPr lang="en-US"/>
           </a:p>
@@ -548,8 +548,8 @@
         </p:nvSpPr>
         <p:spPr>
           <a:xfrm>
-            <a:off x="6629400" y="274638"/>
-            <a:ext cx="2057400" cy="5851525"/>
+            <a:off x="5966460" y="228867"/>
+            <a:ext cx="1851660" cy="4876271"/>
           </a:xfrm>
         </p:spPr>
         <p:txBody>
@@ -576,8 +576,8 @@
         </p:nvSpPr>
         <p:spPr>
           <a:xfrm>
-            <a:off x="457200" y="274638"/>
-            <a:ext cx="6019800" cy="5851525"/>
+            <a:off x="411480" y="228867"/>
+            <a:ext cx="5417820" cy="4876271"/>
           </a:xfrm>
         </p:spPr>
         <p:txBody>
@@ -638,7 +638,7 @@
           <a:p>
             <a:fld id="{A0480C7D-7A79-264F-B28F-B634F7C2F632}" type="datetimeFigureOut">
               <a:rPr lang="en-US" smtClean="0"/>
-              <a:t>5/5/16</a:t>
+              <a:t>8/7/16</a:t>
             </a:fld>
             <a:endParaRPr lang="en-US"/>
           </a:p>
@@ -808,7 +808,7 @@
           <a:p>
             <a:fld id="{A0480C7D-7A79-264F-B28F-B634F7C2F632}" type="datetimeFigureOut">
               <a:rPr lang="en-US" smtClean="0"/>
-              <a:t>5/5/16</a:t>
+              <a:t>8/7/16</a:t>
             </a:fld>
             <a:endParaRPr lang="en-US"/>
           </a:p>
@@ -898,15 +898,15 @@
         </p:nvSpPr>
         <p:spPr>
           <a:xfrm>
-            <a:off x="722313" y="4406900"/>
-            <a:ext cx="7772400" cy="1362075"/>
+            <a:off x="650082" y="3672419"/>
+            <a:ext cx="6995160" cy="1135063"/>
           </a:xfrm>
         </p:spPr>
         <p:txBody>
           <a:bodyPr anchor="t"/>
           <a:lstStyle>
             <a:lvl1pPr algn="l">
-              <a:defRPr sz="4000" b="1" cap="all"/>
+              <a:defRPr sz="3600" b="1" cap="all"/>
             </a:lvl1pPr>
           </a:lstStyle>
           <a:p>
@@ -930,8 +930,8 @@
         </p:nvSpPr>
         <p:spPr>
           <a:xfrm>
-            <a:off x="722313" y="2906713"/>
-            <a:ext cx="7772400" cy="1500187"/>
+            <a:off x="650082" y="2422263"/>
+            <a:ext cx="6995160" cy="1250156"/>
           </a:xfrm>
         </p:spPr>
         <p:txBody>
@@ -939,7 +939,7 @@
           <a:lstStyle>
             <a:lvl1pPr marL="0" indent="0">
               <a:buNone/>
-              <a:defRPr sz="2000">
+              <a:defRPr sz="1800">
                 <a:solidFill>
                   <a:schemeClr val="tx1">
                     <a:tint val="75000"/>
@@ -947,9 +947,9 @@
                 </a:solidFill>
               </a:defRPr>
             </a:lvl1pPr>
-            <a:lvl2pPr marL="457200" indent="0">
-              <a:buNone/>
-              <a:defRPr sz="1800">
+            <a:lvl2pPr marL="415595" indent="0">
+              <a:buNone/>
+              <a:defRPr sz="1600">
                 <a:solidFill>
                   <a:schemeClr val="tx1">
                     <a:tint val="75000"/>
@@ -957,9 +957,9 @@
                 </a:solidFill>
               </a:defRPr>
             </a:lvl2pPr>
-            <a:lvl3pPr marL="914400" indent="0">
-              <a:buNone/>
-              <a:defRPr sz="1600">
+            <a:lvl3pPr marL="831190" indent="0">
+              <a:buNone/>
+              <a:defRPr sz="1500">
                 <a:solidFill>
                   <a:schemeClr val="tx1">
                     <a:tint val="75000"/>
@@ -967,9 +967,9 @@
                 </a:solidFill>
               </a:defRPr>
             </a:lvl3pPr>
-            <a:lvl4pPr marL="1371600" indent="0">
-              <a:buNone/>
-              <a:defRPr sz="1400">
+            <a:lvl4pPr marL="1246784" indent="0">
+              <a:buNone/>
+              <a:defRPr sz="1300">
                 <a:solidFill>
                   <a:schemeClr val="tx1">
                     <a:tint val="75000"/>
@@ -977,9 +977,9 @@
                 </a:solidFill>
               </a:defRPr>
             </a:lvl4pPr>
-            <a:lvl5pPr marL="1828800" indent="0">
-              <a:buNone/>
-              <a:defRPr sz="1400">
+            <a:lvl5pPr marL="1662379" indent="0">
+              <a:buNone/>
+              <a:defRPr sz="1300">
                 <a:solidFill>
                   <a:schemeClr val="tx1">
                     <a:tint val="75000"/>
@@ -987,9 +987,9 @@
                 </a:solidFill>
               </a:defRPr>
             </a:lvl5pPr>
-            <a:lvl6pPr marL="2286000" indent="0">
-              <a:buNone/>
-              <a:defRPr sz="1400">
+            <a:lvl6pPr marL="2077974" indent="0">
+              <a:buNone/>
+              <a:defRPr sz="1300">
                 <a:solidFill>
                   <a:schemeClr val="tx1">
                     <a:tint val="75000"/>
@@ -997,9 +997,9 @@
                 </a:solidFill>
               </a:defRPr>
             </a:lvl6pPr>
-            <a:lvl7pPr marL="2743200" indent="0">
-              <a:buNone/>
-              <a:defRPr sz="1400">
+            <a:lvl7pPr marL="2493569" indent="0">
+              <a:buNone/>
+              <a:defRPr sz="1300">
                 <a:solidFill>
                   <a:schemeClr val="tx1">
                     <a:tint val="75000"/>
@@ -1007,9 +1007,9 @@
                 </a:solidFill>
               </a:defRPr>
             </a:lvl7pPr>
-            <a:lvl8pPr marL="3200400" indent="0">
-              <a:buNone/>
-              <a:defRPr sz="1400">
+            <a:lvl8pPr marL="2909164" indent="0">
+              <a:buNone/>
+              <a:defRPr sz="1300">
                 <a:solidFill>
                   <a:schemeClr val="tx1">
                     <a:tint val="75000"/>
@@ -1017,9 +1017,9 @@
                 </a:solidFill>
               </a:defRPr>
             </a:lvl8pPr>
-            <a:lvl9pPr marL="3657600" indent="0">
-              <a:buNone/>
-              <a:defRPr sz="1400">
+            <a:lvl9pPr marL="3324758" indent="0">
+              <a:buNone/>
+              <a:defRPr sz="1300">
                 <a:solidFill>
                   <a:schemeClr val="tx1">
                     <a:tint val="75000"/>
@@ -1054,7 +1054,7 @@
           <a:p>
             <a:fld id="{A0480C7D-7A79-264F-B28F-B634F7C2F632}" type="datetimeFigureOut">
               <a:rPr lang="en-US" smtClean="0"/>
-              <a:t>5/5/16</a:t>
+              <a:t>8/7/16</a:t>
             </a:fld>
             <a:endParaRPr lang="en-US"/>
           </a:p>
@@ -1167,39 +1167,39 @@
         </p:nvSpPr>
         <p:spPr>
           <a:xfrm>
-            <a:off x="457200" y="1600200"/>
-            <a:ext cx="4038600" cy="4525963"/>
+            <a:off x="411480" y="1333502"/>
+            <a:ext cx="3634740" cy="3771635"/>
           </a:xfrm>
         </p:spPr>
         <p:txBody>
           <a:bodyPr/>
           <a:lstStyle>
             <a:lvl1pPr>
-              <a:defRPr sz="2800"/>
+              <a:defRPr sz="2500"/>
             </a:lvl1pPr>
             <a:lvl2pPr>
-              <a:defRPr sz="2400"/>
+              <a:defRPr sz="2200"/>
             </a:lvl2pPr>
             <a:lvl3pPr>
-              <a:defRPr sz="2000"/>
+              <a:defRPr sz="1800"/>
             </a:lvl3pPr>
             <a:lvl4pPr>
-              <a:defRPr sz="1800"/>
+              <a:defRPr sz="1600"/>
             </a:lvl4pPr>
             <a:lvl5pPr>
-              <a:defRPr sz="1800"/>
+              <a:defRPr sz="1600"/>
             </a:lvl5pPr>
             <a:lvl6pPr>
-              <a:defRPr sz="1800"/>
+              <a:defRPr sz="1600"/>
             </a:lvl6pPr>
             <a:lvl7pPr>
-              <a:defRPr sz="1800"/>
+              <a:defRPr sz="1600"/>
             </a:lvl7pPr>
             <a:lvl8pPr>
-              <a:defRPr sz="1800"/>
+              <a:defRPr sz="1600"/>
             </a:lvl8pPr>
             <a:lvl9pPr>
-              <a:defRPr sz="1800"/>
+              <a:defRPr sz="1600"/>
             </a:lvl9pPr>
           </a:lstStyle>
           <a:p>
@@ -1252,39 +1252,39 @@
         </p:nvSpPr>
         <p:spPr>
           <a:xfrm>
-            <a:off x="4648200" y="1600200"/>
-            <a:ext cx="4038600" cy="4525963"/>
+            <a:off x="4183380" y="1333502"/>
+            <a:ext cx="3634740" cy="3771635"/>
           </a:xfrm>
         </p:spPr>
         <p:txBody>
           <a:bodyPr/>
           <a:lstStyle>
             <a:lvl1pPr>
-              <a:defRPr sz="2800"/>
+              <a:defRPr sz="2500"/>
             </a:lvl1pPr>
             <a:lvl2pPr>
-              <a:defRPr sz="2400"/>
+              <a:defRPr sz="2200"/>
             </a:lvl2pPr>
             <a:lvl3pPr>
-              <a:defRPr sz="2000"/>
+              <a:defRPr sz="1800"/>
             </a:lvl3pPr>
             <a:lvl4pPr>
-              <a:defRPr sz="1800"/>
+              <a:defRPr sz="1600"/>
             </a:lvl4pPr>
             <a:lvl5pPr>
-              <a:defRPr sz="1800"/>
+              <a:defRPr sz="1600"/>
             </a:lvl5pPr>
             <a:lvl6pPr>
-              <a:defRPr sz="1800"/>
+              <a:defRPr sz="1600"/>
             </a:lvl6pPr>
             <a:lvl7pPr>
-              <a:defRPr sz="1800"/>
+              <a:defRPr sz="1600"/>
             </a:lvl7pPr>
             <a:lvl8pPr>
-              <a:defRPr sz="1800"/>
+              <a:defRPr sz="1600"/>
             </a:lvl8pPr>
             <a:lvl9pPr>
-              <a:defRPr sz="1800"/>
+              <a:defRPr sz="1600"/>
             </a:lvl9pPr>
           </a:lstStyle>
           <a:p>
@@ -1342,7 +1342,7 @@
           <a:p>
             <a:fld id="{A0480C7D-7A79-264F-B28F-B634F7C2F632}" type="datetimeFigureOut">
               <a:rPr lang="en-US" smtClean="0"/>
-              <a:t>5/5/16</a:t>
+              <a:t>8/7/16</a:t>
             </a:fld>
             <a:endParaRPr lang="en-US"/>
           </a:p>
@@ -1459,8 +1459,8 @@
         </p:nvSpPr>
         <p:spPr>
           <a:xfrm>
-            <a:off x="457200" y="1535113"/>
-            <a:ext cx="4040188" cy="639762"/>
+            <a:off x="411481" y="1279261"/>
+            <a:ext cx="3636169" cy="533134"/>
           </a:xfrm>
         </p:spPr>
         <p:txBody>
@@ -1468,39 +1468,39 @@
           <a:lstStyle>
             <a:lvl1pPr marL="0" indent="0">
               <a:buNone/>
-              <a:defRPr sz="2400" b="1"/>
+              <a:defRPr sz="2200" b="1"/>
             </a:lvl1pPr>
-            <a:lvl2pPr marL="457200" indent="0">
-              <a:buNone/>
-              <a:defRPr sz="2000" b="1"/>
+            <a:lvl2pPr marL="415595" indent="0">
+              <a:buNone/>
+              <a:defRPr sz="1800" b="1"/>
             </a:lvl2pPr>
-            <a:lvl3pPr marL="914400" indent="0">
-              <a:buNone/>
-              <a:defRPr sz="1800" b="1"/>
+            <a:lvl3pPr marL="831190" indent="0">
+              <a:buNone/>
+              <a:defRPr sz="1600" b="1"/>
             </a:lvl3pPr>
-            <a:lvl4pPr marL="1371600" indent="0">
-              <a:buNone/>
-              <a:defRPr sz="1600" b="1"/>
+            <a:lvl4pPr marL="1246784" indent="0">
+              <a:buNone/>
+              <a:defRPr sz="1500" b="1"/>
             </a:lvl4pPr>
-            <a:lvl5pPr marL="1828800" indent="0">
-              <a:buNone/>
-              <a:defRPr sz="1600" b="1"/>
+            <a:lvl5pPr marL="1662379" indent="0">
+              <a:buNone/>
+              <a:defRPr sz="1500" b="1"/>
             </a:lvl5pPr>
-            <a:lvl6pPr marL="2286000" indent="0">
-              <a:buNone/>
-              <a:defRPr sz="1600" b="1"/>
+            <a:lvl6pPr marL="2077974" indent="0">
+              <a:buNone/>
+              <a:defRPr sz="1500" b="1"/>
             </a:lvl6pPr>
-            <a:lvl7pPr marL="2743200" indent="0">
-              <a:buNone/>
-              <a:defRPr sz="1600" b="1"/>
+            <a:lvl7pPr marL="2493569" indent="0">
+              <a:buNone/>
+              <a:defRPr sz="1500" b="1"/>
             </a:lvl7pPr>
-            <a:lvl8pPr marL="3200400" indent="0">
-              <a:buNone/>
-              <a:defRPr sz="1600" b="1"/>
+            <a:lvl8pPr marL="2909164" indent="0">
+              <a:buNone/>
+              <a:defRPr sz="1500" b="1"/>
             </a:lvl8pPr>
-            <a:lvl9pPr marL="3657600" indent="0">
-              <a:buNone/>
-              <a:defRPr sz="1600" b="1"/>
+            <a:lvl9pPr marL="3324758" indent="0">
+              <a:buNone/>
+              <a:defRPr sz="1500" b="1"/>
             </a:lvl9pPr>
           </a:lstStyle>
           <a:p>
@@ -1524,39 +1524,39 @@
         </p:nvSpPr>
         <p:spPr>
           <a:xfrm>
-            <a:off x="457200" y="2174875"/>
-            <a:ext cx="4040188" cy="3951288"/>
+            <a:off x="411481" y="1812395"/>
+            <a:ext cx="3636169" cy="3292741"/>
           </a:xfrm>
         </p:spPr>
         <p:txBody>
           <a:bodyPr/>
           <a:lstStyle>
             <a:lvl1pPr>
-              <a:defRPr sz="2400"/>
+              <a:defRPr sz="2200"/>
             </a:lvl1pPr>
             <a:lvl2pPr>
-              <a:defRPr sz="2000"/>
+              <a:defRPr sz="1800"/>
             </a:lvl2pPr>
             <a:lvl3pPr>
-              <a:defRPr sz="1800"/>
+              <a:defRPr sz="1600"/>
             </a:lvl3pPr>
             <a:lvl4pPr>
-              <a:defRPr sz="1600"/>
+              <a:defRPr sz="1500"/>
             </a:lvl4pPr>
             <a:lvl5pPr>
-              <a:defRPr sz="1600"/>
+              <a:defRPr sz="1500"/>
             </a:lvl5pPr>
             <a:lvl6pPr>
-              <a:defRPr sz="1600"/>
+              <a:defRPr sz="1500"/>
             </a:lvl6pPr>
             <a:lvl7pPr>
-              <a:defRPr sz="1600"/>
+              <a:defRPr sz="1500"/>
             </a:lvl7pPr>
             <a:lvl8pPr>
-              <a:defRPr sz="1600"/>
+              <a:defRPr sz="1500"/>
             </a:lvl8pPr>
             <a:lvl9pPr>
-              <a:defRPr sz="1600"/>
+              <a:defRPr sz="1500"/>
             </a:lvl9pPr>
           </a:lstStyle>
           <a:p>
@@ -1609,8 +1609,8 @@
         </p:nvSpPr>
         <p:spPr>
           <a:xfrm>
-            <a:off x="4645025" y="1535113"/>
-            <a:ext cx="4041775" cy="639762"/>
+            <a:off x="4180525" y="1279261"/>
+            <a:ext cx="3637598" cy="533134"/>
           </a:xfrm>
         </p:spPr>
         <p:txBody>
@@ -1618,39 +1618,39 @@
           <a:lstStyle>
             <a:lvl1pPr marL="0" indent="0">
               <a:buNone/>
-              <a:defRPr sz="2400" b="1"/>
+              <a:defRPr sz="2200" b="1"/>
             </a:lvl1pPr>
-            <a:lvl2pPr marL="457200" indent="0">
-              <a:buNone/>
-              <a:defRPr sz="2000" b="1"/>
+            <a:lvl2pPr marL="415595" indent="0">
+              <a:buNone/>
+              <a:defRPr sz="1800" b="1"/>
             </a:lvl2pPr>
-            <a:lvl3pPr marL="914400" indent="0">
-              <a:buNone/>
-              <a:defRPr sz="1800" b="1"/>
+            <a:lvl3pPr marL="831190" indent="0">
+              <a:buNone/>
+              <a:defRPr sz="1600" b="1"/>
             </a:lvl3pPr>
-            <a:lvl4pPr marL="1371600" indent="0">
-              <a:buNone/>
-              <a:defRPr sz="1600" b="1"/>
+            <a:lvl4pPr marL="1246784" indent="0">
+              <a:buNone/>
+              <a:defRPr sz="1500" b="1"/>
             </a:lvl4pPr>
-            <a:lvl5pPr marL="1828800" indent="0">
-              <a:buNone/>
-              <a:defRPr sz="1600" b="1"/>
+            <a:lvl5pPr marL="1662379" indent="0">
+              <a:buNone/>
+              <a:defRPr sz="1500" b="1"/>
             </a:lvl5pPr>
-            <a:lvl6pPr marL="2286000" indent="0">
-              <a:buNone/>
-              <a:defRPr sz="1600" b="1"/>
+            <a:lvl6pPr marL="2077974" indent="0">
+              <a:buNone/>
+              <a:defRPr sz="1500" b="1"/>
             </a:lvl6pPr>
-            <a:lvl7pPr marL="2743200" indent="0">
-              <a:buNone/>
-              <a:defRPr sz="1600" b="1"/>
+            <a:lvl7pPr marL="2493569" indent="0">
+              <a:buNone/>
+              <a:defRPr sz="1500" b="1"/>
             </a:lvl7pPr>
-            <a:lvl8pPr marL="3200400" indent="0">
-              <a:buNone/>
-              <a:defRPr sz="1600" b="1"/>
+            <a:lvl8pPr marL="2909164" indent="0">
+              <a:buNone/>
+              <a:defRPr sz="1500" b="1"/>
             </a:lvl8pPr>
-            <a:lvl9pPr marL="3657600" indent="0">
-              <a:buNone/>
-              <a:defRPr sz="1600" b="1"/>
+            <a:lvl9pPr marL="3324758" indent="0">
+              <a:buNone/>
+              <a:defRPr sz="1500" b="1"/>
             </a:lvl9pPr>
           </a:lstStyle>
           <a:p>
@@ -1674,39 +1674,39 @@
         </p:nvSpPr>
         <p:spPr>
           <a:xfrm>
-            <a:off x="4645025" y="2174875"/>
-            <a:ext cx="4041775" cy="3951288"/>
+            <a:off x="4180525" y="1812395"/>
+            <a:ext cx="3637598" cy="3292741"/>
           </a:xfrm>
         </p:spPr>
         <p:txBody>
           <a:bodyPr/>
           <a:lstStyle>
             <a:lvl1pPr>
-              <a:defRPr sz="2400"/>
+              <a:defRPr sz="2200"/>
             </a:lvl1pPr>
             <a:lvl2pPr>
-              <a:defRPr sz="2000"/>
+              <a:defRPr sz="1800"/>
             </a:lvl2pPr>
             <a:lvl3pPr>
-              <a:defRPr sz="1800"/>
+              <a:defRPr sz="1600"/>
             </a:lvl3pPr>
             <a:lvl4pPr>
-              <a:defRPr sz="1600"/>
+              <a:defRPr sz="1500"/>
             </a:lvl4pPr>
             <a:lvl5pPr>
-              <a:defRPr sz="1600"/>
+              <a:defRPr sz="1500"/>
             </a:lvl5pPr>
             <a:lvl6pPr>
-              <a:defRPr sz="1600"/>
+              <a:defRPr sz="1500"/>
             </a:lvl6pPr>
             <a:lvl7pPr>
-              <a:defRPr sz="1600"/>
+              <a:defRPr sz="1500"/>
             </a:lvl7pPr>
             <a:lvl8pPr>
-              <a:defRPr sz="1600"/>
+              <a:defRPr sz="1500"/>
             </a:lvl8pPr>
             <a:lvl9pPr>
-              <a:defRPr sz="1600"/>
+              <a:defRPr sz="1500"/>
             </a:lvl9pPr>
           </a:lstStyle>
           <a:p>
@@ -1764,7 +1764,7 @@
           <a:p>
             <a:fld id="{A0480C7D-7A79-264F-B28F-B634F7C2F632}" type="datetimeFigureOut">
               <a:rPr lang="en-US" smtClean="0"/>
-              <a:t>5/5/16</a:t>
+              <a:t>8/7/16</a:t>
             </a:fld>
             <a:endParaRPr lang="en-US"/>
           </a:p>
@@ -1882,7 +1882,7 @@
           <a:p>
             <a:fld id="{A0480C7D-7A79-264F-B28F-B634F7C2F632}" type="datetimeFigureOut">
               <a:rPr lang="en-US" smtClean="0"/>
-              <a:t>5/5/16</a:t>
+              <a:t>8/7/16</a:t>
             </a:fld>
             <a:endParaRPr lang="en-US"/>
           </a:p>
@@ -1977,7 +1977,7 @@
           <a:p>
             <a:fld id="{A0480C7D-7A79-264F-B28F-B634F7C2F632}" type="datetimeFigureOut">
               <a:rPr lang="en-US" smtClean="0"/>
-              <a:t>5/5/16</a:t>
+              <a:t>8/7/16</a:t>
             </a:fld>
             <a:endParaRPr lang="en-US"/>
           </a:p>
@@ -2067,15 +2067,15 @@
         </p:nvSpPr>
         <p:spPr>
           <a:xfrm>
-            <a:off x="457200" y="273050"/>
-            <a:ext cx="3008313" cy="1162050"/>
+            <a:off x="411483" y="227542"/>
+            <a:ext cx="2707482" cy="968375"/>
           </a:xfrm>
         </p:spPr>
         <p:txBody>
           <a:bodyPr anchor="b"/>
           <a:lstStyle>
             <a:lvl1pPr algn="l">
-              <a:defRPr sz="2000" b="1"/>
+              <a:defRPr sz="1800" b="1"/>
             </a:lvl1pPr>
           </a:lstStyle>
           <a:p>
@@ -2099,39 +2099,39 @@
         </p:nvSpPr>
         <p:spPr>
           <a:xfrm>
-            <a:off x="3575050" y="273050"/>
-            <a:ext cx="5111750" cy="5853113"/>
+            <a:off x="3217546" y="227544"/>
+            <a:ext cx="4600575" cy="4877594"/>
           </a:xfrm>
         </p:spPr>
         <p:txBody>
           <a:bodyPr/>
           <a:lstStyle>
             <a:lvl1pPr>
-              <a:defRPr sz="3200"/>
+              <a:defRPr sz="2900"/>
             </a:lvl1pPr>
             <a:lvl2pPr>
-              <a:defRPr sz="2800"/>
+              <a:defRPr sz="2500"/>
             </a:lvl2pPr>
             <a:lvl3pPr>
-              <a:defRPr sz="2400"/>
+              <a:defRPr sz="2200"/>
             </a:lvl3pPr>
             <a:lvl4pPr>
-              <a:defRPr sz="2000"/>
+              <a:defRPr sz="1800"/>
             </a:lvl4pPr>
             <a:lvl5pPr>
-              <a:defRPr sz="2000"/>
+              <a:defRPr sz="1800"/>
             </a:lvl5pPr>
             <a:lvl6pPr>
-              <a:defRPr sz="2000"/>
+              <a:defRPr sz="1800"/>
             </a:lvl6pPr>
             <a:lvl7pPr>
-              <a:defRPr sz="2000"/>
+              <a:defRPr sz="1800"/>
             </a:lvl7pPr>
             <a:lvl8pPr>
-              <a:defRPr sz="2000"/>
+              <a:defRPr sz="1800"/>
             </a:lvl8pPr>
             <a:lvl9pPr>
-              <a:defRPr sz="2000"/>
+              <a:defRPr sz="1800"/>
             </a:lvl9pPr>
           </a:lstStyle>
           <a:p>
@@ -2184,8 +2184,8 @@
         </p:nvSpPr>
         <p:spPr>
           <a:xfrm>
-            <a:off x="457200" y="1435100"/>
-            <a:ext cx="3008313" cy="4691063"/>
+            <a:off x="411483" y="1195919"/>
+            <a:ext cx="2707482" cy="3909219"/>
           </a:xfrm>
         </p:spPr>
         <p:txBody>
@@ -2193,39 +2193,39 @@
           <a:lstStyle>
             <a:lvl1pPr marL="0" indent="0">
               <a:buNone/>
-              <a:defRPr sz="1400"/>
+              <a:defRPr sz="1300"/>
             </a:lvl1pPr>
-            <a:lvl2pPr marL="457200" indent="0">
-              <a:buNone/>
-              <a:defRPr sz="1200"/>
+            <a:lvl2pPr marL="415595" indent="0">
+              <a:buNone/>
+              <a:defRPr sz="1100"/>
             </a:lvl2pPr>
-            <a:lvl3pPr marL="914400" indent="0">
-              <a:buNone/>
-              <a:defRPr sz="1000"/>
+            <a:lvl3pPr marL="831190" indent="0">
+              <a:buNone/>
+              <a:defRPr sz="900"/>
             </a:lvl3pPr>
-            <a:lvl4pPr marL="1371600" indent="0">
-              <a:buNone/>
-              <a:defRPr sz="900"/>
+            <a:lvl4pPr marL="1246784" indent="0">
+              <a:buNone/>
+              <a:defRPr sz="800"/>
             </a:lvl4pPr>
-            <a:lvl5pPr marL="1828800" indent="0">
-              <a:buNone/>
-              <a:defRPr sz="900"/>
+            <a:lvl5pPr marL="1662379" indent="0">
+              <a:buNone/>
+              <a:defRPr sz="800"/>
             </a:lvl5pPr>
-            <a:lvl6pPr marL="2286000" indent="0">
-              <a:buNone/>
-              <a:defRPr sz="900"/>
+            <a:lvl6pPr marL="2077974" indent="0">
+              <a:buNone/>
+              <a:defRPr sz="800"/>
             </a:lvl6pPr>
-            <a:lvl7pPr marL="2743200" indent="0">
-              <a:buNone/>
-              <a:defRPr sz="900"/>
+            <a:lvl7pPr marL="2493569" indent="0">
+              <a:buNone/>
+              <a:defRPr sz="800"/>
             </a:lvl7pPr>
-            <a:lvl8pPr marL="3200400" indent="0">
-              <a:buNone/>
-              <a:defRPr sz="900"/>
+            <a:lvl8pPr marL="2909164" indent="0">
+              <a:buNone/>
+              <a:defRPr sz="800"/>
             </a:lvl8pPr>
-            <a:lvl9pPr marL="3657600" indent="0">
-              <a:buNone/>
-              <a:defRPr sz="900"/>
+            <a:lvl9pPr marL="3324758" indent="0">
+              <a:buNone/>
+              <a:defRPr sz="800"/>
             </a:lvl9pPr>
           </a:lstStyle>
           <a:p>
@@ -2254,7 +2254,7 @@
           <a:p>
             <a:fld id="{A0480C7D-7A79-264F-B28F-B634F7C2F632}" type="datetimeFigureOut">
               <a:rPr lang="en-US" smtClean="0"/>
-              <a:t>5/5/16</a:t>
+              <a:t>8/7/16</a:t>
             </a:fld>
             <a:endParaRPr lang="en-US"/>
           </a:p>
@@ -2344,15 +2344,15 @@
         </p:nvSpPr>
         <p:spPr>
           <a:xfrm>
-            <a:off x="1792288" y="4800600"/>
-            <a:ext cx="5486400" cy="566738"/>
+            <a:off x="1613059" y="4000502"/>
+            <a:ext cx="4937760" cy="472281"/>
           </a:xfrm>
         </p:spPr>
         <p:txBody>
           <a:bodyPr anchor="b"/>
           <a:lstStyle>
             <a:lvl1pPr algn="l">
-              <a:defRPr sz="2000" b="1"/>
+              <a:defRPr sz="1800" b="1"/>
             </a:lvl1pPr>
           </a:lstStyle>
           <a:p>
@@ -2376,8 +2376,8 @@
         </p:nvSpPr>
         <p:spPr>
           <a:xfrm>
-            <a:off x="1792288" y="612775"/>
-            <a:ext cx="5486400" cy="4114800"/>
+            <a:off x="1613059" y="510646"/>
+            <a:ext cx="4937760" cy="3429000"/>
           </a:xfrm>
         </p:spPr>
         <p:txBody>
@@ -2385,39 +2385,39 @@
           <a:lstStyle>
             <a:lvl1pPr marL="0" indent="0">
               <a:buNone/>
-              <a:defRPr sz="3200"/>
+              <a:defRPr sz="2900"/>
             </a:lvl1pPr>
-            <a:lvl2pPr marL="457200" indent="0">
-              <a:buNone/>
-              <a:defRPr sz="2800"/>
+            <a:lvl2pPr marL="415595" indent="0">
+              <a:buNone/>
+              <a:defRPr sz="2500"/>
             </a:lvl2pPr>
-            <a:lvl3pPr marL="914400" indent="0">
-              <a:buNone/>
-              <a:defRPr sz="2400"/>
+            <a:lvl3pPr marL="831190" indent="0">
+              <a:buNone/>
+              <a:defRPr sz="2200"/>
             </a:lvl3pPr>
-            <a:lvl4pPr marL="1371600" indent="0">
-              <a:buNone/>
-              <a:defRPr sz="2000"/>
+            <a:lvl4pPr marL="1246784" indent="0">
+              <a:buNone/>
+              <a:defRPr sz="1800"/>
             </a:lvl4pPr>
-            <a:lvl5pPr marL="1828800" indent="0">
-              <a:buNone/>
-              <a:defRPr sz="2000"/>
+            <a:lvl5pPr marL="1662379" indent="0">
+              <a:buNone/>
+              <a:defRPr sz="1800"/>
             </a:lvl5pPr>
-            <a:lvl6pPr marL="2286000" indent="0">
-              <a:buNone/>
-              <a:defRPr sz="2000"/>
+            <a:lvl6pPr marL="2077974" indent="0">
+              <a:buNone/>
+              <a:defRPr sz="1800"/>
             </a:lvl6pPr>
-            <a:lvl7pPr marL="2743200" indent="0">
-              <a:buNone/>
-              <a:defRPr sz="2000"/>
+            <a:lvl7pPr marL="2493569" indent="0">
+              <a:buNone/>
+              <a:defRPr sz="1800"/>
             </a:lvl7pPr>
-            <a:lvl8pPr marL="3200400" indent="0">
-              <a:buNone/>
-              <a:defRPr sz="2000"/>
+            <a:lvl8pPr marL="2909164" indent="0">
+              <a:buNone/>
+              <a:defRPr sz="1800"/>
             </a:lvl8pPr>
-            <a:lvl9pPr marL="3657600" indent="0">
-              <a:buNone/>
-              <a:defRPr sz="2000"/>
+            <a:lvl9pPr marL="3324758" indent="0">
+              <a:buNone/>
+              <a:defRPr sz="1800"/>
             </a:lvl9pPr>
           </a:lstStyle>
           <a:p>
@@ -2437,8 +2437,8 @@
         </p:nvSpPr>
         <p:spPr>
           <a:xfrm>
-            <a:off x="1792288" y="5367338"/>
-            <a:ext cx="5486400" cy="804862"/>
+            <a:off x="1613059" y="4472783"/>
+            <a:ext cx="4937760" cy="670719"/>
           </a:xfrm>
         </p:spPr>
         <p:txBody>
@@ -2446,39 +2446,39 @@
           <a:lstStyle>
             <a:lvl1pPr marL="0" indent="0">
               <a:buNone/>
-              <a:defRPr sz="1400"/>
+              <a:defRPr sz="1300"/>
             </a:lvl1pPr>
-            <a:lvl2pPr marL="457200" indent="0">
-              <a:buNone/>
-              <a:defRPr sz="1200"/>
+            <a:lvl2pPr marL="415595" indent="0">
+              <a:buNone/>
+              <a:defRPr sz="1100"/>
             </a:lvl2pPr>
-            <a:lvl3pPr marL="914400" indent="0">
-              <a:buNone/>
-              <a:defRPr sz="1000"/>
+            <a:lvl3pPr marL="831190" indent="0">
+              <a:buNone/>
+              <a:defRPr sz="900"/>
             </a:lvl3pPr>
-            <a:lvl4pPr marL="1371600" indent="0">
-              <a:buNone/>
-              <a:defRPr sz="900"/>
+            <a:lvl4pPr marL="1246784" indent="0">
+              <a:buNone/>
+              <a:defRPr sz="800"/>
             </a:lvl4pPr>
-            <a:lvl5pPr marL="1828800" indent="0">
-              <a:buNone/>
-              <a:defRPr sz="900"/>
+            <a:lvl5pPr marL="1662379" indent="0">
+              <a:buNone/>
+              <a:defRPr sz="800"/>
             </a:lvl5pPr>
-            <a:lvl6pPr marL="2286000" indent="0">
-              <a:buNone/>
-              <a:defRPr sz="900"/>
+            <a:lvl6pPr marL="2077974" indent="0">
+              <a:buNone/>
+              <a:defRPr sz="800"/>
             </a:lvl6pPr>
-            <a:lvl7pPr marL="2743200" indent="0">
-              <a:buNone/>
-              <a:defRPr sz="900"/>
+            <a:lvl7pPr marL="2493569" indent="0">
+              <a:buNone/>
+              <a:defRPr sz="800"/>
             </a:lvl7pPr>
-            <a:lvl8pPr marL="3200400" indent="0">
-              <a:buNone/>
-              <a:defRPr sz="900"/>
+            <a:lvl8pPr marL="2909164" indent="0">
+              <a:buNone/>
+              <a:defRPr sz="800"/>
             </a:lvl8pPr>
-            <a:lvl9pPr marL="3657600" indent="0">
-              <a:buNone/>
-              <a:defRPr sz="900"/>
+            <a:lvl9pPr marL="3324758" indent="0">
+              <a:buNone/>
+              <a:defRPr sz="800"/>
             </a:lvl9pPr>
           </a:lstStyle>
           <a:p>
@@ -2507,7 +2507,7 @@
           <a:p>
             <a:fld id="{A0480C7D-7A79-264F-B28F-B634F7C2F632}" type="datetimeFigureOut">
               <a:rPr lang="en-US" smtClean="0"/>
-              <a:t>5/5/16</a:t>
+              <a:t>8/7/16</a:t>
             </a:fld>
             <a:endParaRPr lang="en-US"/>
           </a:p>
@@ -2602,15 +2602,15 @@
         </p:nvSpPr>
         <p:spPr>
           <a:xfrm>
-            <a:off x="457200" y="274638"/>
-            <a:ext cx="8229600" cy="1143000"/>
+            <a:off x="411480" y="228866"/>
+            <a:ext cx="7406640" cy="952500"/>
           </a:xfrm>
           <a:prstGeom prst="rect">
             <a:avLst/>
           </a:prstGeom>
         </p:spPr>
         <p:txBody>
-          <a:bodyPr vert="horz" lIns="91440" tIns="45720" rIns="91440" bIns="45720" rtlCol="0" anchor="ctr">
+          <a:bodyPr vert="horz" lIns="83119" tIns="41559" rIns="83119" bIns="41559" rtlCol="0" anchor="ctr">
             <a:normAutofit/>
           </a:bodyPr>
           <a:lstStyle/>
@@ -2635,15 +2635,15 @@
         </p:nvSpPr>
         <p:spPr>
           <a:xfrm>
-            <a:off x="457200" y="1600200"/>
-            <a:ext cx="8229600" cy="4525963"/>
+            <a:off x="411480" y="1333502"/>
+            <a:ext cx="7406640" cy="3771635"/>
           </a:xfrm>
           <a:prstGeom prst="rect">
             <a:avLst/>
           </a:prstGeom>
         </p:spPr>
         <p:txBody>
-          <a:bodyPr vert="horz" lIns="91440" tIns="45720" rIns="91440" bIns="45720" rtlCol="0">
+          <a:bodyPr vert="horz" lIns="83119" tIns="41559" rIns="83119" bIns="41559" rtlCol="0">
             <a:normAutofit/>
           </a:bodyPr>
           <a:lstStyle/>
@@ -2697,18 +2697,18 @@
         </p:nvSpPr>
         <p:spPr>
           <a:xfrm>
-            <a:off x="457200" y="6356350"/>
-            <a:ext cx="2133600" cy="365125"/>
+            <a:off x="411480" y="5296959"/>
+            <a:ext cx="1920240" cy="304271"/>
           </a:xfrm>
           <a:prstGeom prst="rect">
             <a:avLst/>
           </a:prstGeom>
         </p:spPr>
         <p:txBody>
-          <a:bodyPr vert="horz" lIns="91440" tIns="45720" rIns="91440" bIns="45720" rtlCol="0" anchor="ctr"/>
+          <a:bodyPr vert="horz" lIns="83119" tIns="41559" rIns="83119" bIns="41559" rtlCol="0" anchor="ctr"/>
           <a:lstStyle>
             <a:lvl1pPr algn="l">
-              <a:defRPr sz="1200">
+              <a:defRPr sz="1100">
                 <a:solidFill>
                   <a:schemeClr val="tx1">
                     <a:tint val="75000"/>
@@ -2720,7 +2720,7 @@
           <a:p>
             <a:fld id="{A0480C7D-7A79-264F-B28F-B634F7C2F632}" type="datetimeFigureOut">
               <a:rPr lang="en-US" smtClean="0"/>
-              <a:t>5/5/16</a:t>
+              <a:t>8/7/16</a:t>
             </a:fld>
             <a:endParaRPr lang="en-US"/>
           </a:p>
@@ -2738,18 +2738,18 @@
         </p:nvSpPr>
         <p:spPr>
           <a:xfrm>
-            <a:off x="3124200" y="6356350"/>
-            <a:ext cx="2895600" cy="365125"/>
+            <a:off x="2811780" y="5296959"/>
+            <a:ext cx="2606040" cy="304271"/>
           </a:xfrm>
           <a:prstGeom prst="rect">
             <a:avLst/>
           </a:prstGeom>
         </p:spPr>
         <p:txBody>
-          <a:bodyPr vert="horz" lIns="91440" tIns="45720" rIns="91440" bIns="45720" rtlCol="0" anchor="ctr"/>
+          <a:bodyPr vert="horz" lIns="83119" tIns="41559" rIns="83119" bIns="41559" rtlCol="0" anchor="ctr"/>
           <a:lstStyle>
             <a:lvl1pPr algn="ctr">
-              <a:defRPr sz="1200">
+              <a:defRPr sz="1100">
                 <a:solidFill>
                   <a:schemeClr val="tx1">
                     <a:tint val="75000"/>
@@ -2775,18 +2775,18 @@
         </p:nvSpPr>
         <p:spPr>
           <a:xfrm>
-            <a:off x="6553200" y="6356350"/>
-            <a:ext cx="2133600" cy="365125"/>
+            <a:off x="5897880" y="5296959"/>
+            <a:ext cx="1920240" cy="304271"/>
           </a:xfrm>
           <a:prstGeom prst="rect">
             <a:avLst/>
           </a:prstGeom>
         </p:spPr>
         <p:txBody>
-          <a:bodyPr vert="horz" lIns="91440" tIns="45720" rIns="91440" bIns="45720" rtlCol="0" anchor="ctr"/>
+          <a:bodyPr vert="horz" lIns="83119" tIns="41559" rIns="83119" bIns="41559" rtlCol="0" anchor="ctr"/>
           <a:lstStyle>
             <a:lvl1pPr algn="r">
-              <a:defRPr sz="1200">
+              <a:defRPr sz="1100">
                 <a:solidFill>
                   <a:schemeClr val="tx1">
                     <a:tint val="75000"/>
@@ -2827,12 +2827,12 @@
   </p:sldLayoutIdLst>
   <p:txStyles>
     <p:titleStyle>
-      <a:lvl1pPr algn="ctr" defTabSz="457200" rtl="0" eaLnBrk="1" latinLnBrk="0" hangingPunct="1">
+      <a:lvl1pPr algn="ctr" defTabSz="415595" rtl="0" eaLnBrk="1" latinLnBrk="0" hangingPunct="1">
         <a:spcBef>
           <a:spcPct val="0"/>
         </a:spcBef>
         <a:buNone/>
-        <a:defRPr sz="4400" kern="1200">
+        <a:defRPr sz="4000" kern="1200">
           <a:solidFill>
             <a:schemeClr val="tx1"/>
           </a:solidFill>
@@ -2843,13 +2843,13 @@
       </a:lvl1pPr>
     </p:titleStyle>
     <p:bodyStyle>
-      <a:lvl1pPr marL="342900" indent="-342900" algn="l" defTabSz="457200" rtl="0" eaLnBrk="1" latinLnBrk="0" hangingPunct="1">
+      <a:lvl1pPr marL="311696" indent="-311696" algn="l" defTabSz="415595" rtl="0" eaLnBrk="1" latinLnBrk="0" hangingPunct="1">
         <a:spcBef>
           <a:spcPct val="20000"/>
         </a:spcBef>
         <a:buFont typeface="Arial"/>
         <a:buChar char="•"/>
-        <a:defRPr sz="3200" kern="1200">
+        <a:defRPr sz="2900" kern="1200">
           <a:solidFill>
             <a:schemeClr val="tx1"/>
           </a:solidFill>
@@ -2858,13 +2858,13 @@
           <a:cs typeface="+mn-cs"/>
         </a:defRPr>
       </a:lvl1pPr>
-      <a:lvl2pPr marL="742950" indent="-285750" algn="l" defTabSz="457200" rtl="0" eaLnBrk="1" latinLnBrk="0" hangingPunct="1">
+      <a:lvl2pPr marL="675342" indent="-259747" algn="l" defTabSz="415595" rtl="0" eaLnBrk="1" latinLnBrk="0" hangingPunct="1">
         <a:spcBef>
           <a:spcPct val="20000"/>
         </a:spcBef>
         <a:buFont typeface="Arial"/>
         <a:buChar char="–"/>
-        <a:defRPr sz="2800" kern="1200">
+        <a:defRPr sz="2500" kern="1200">
           <a:solidFill>
             <a:schemeClr val="tx1"/>
           </a:solidFill>
@@ -2873,13 +2873,13 @@
           <a:cs typeface="+mn-cs"/>
         </a:defRPr>
       </a:lvl2pPr>
-      <a:lvl3pPr marL="1143000" indent="-228600" algn="l" defTabSz="457200" rtl="0" eaLnBrk="1" latinLnBrk="0" hangingPunct="1">
+      <a:lvl3pPr marL="1038987" indent="-207797" algn="l" defTabSz="415595" rtl="0" eaLnBrk="1" latinLnBrk="0" hangingPunct="1">
         <a:spcBef>
           <a:spcPct val="20000"/>
         </a:spcBef>
         <a:buFont typeface="Arial"/>
         <a:buChar char="•"/>
-        <a:defRPr sz="2400" kern="1200">
+        <a:defRPr sz="2200" kern="1200">
           <a:solidFill>
             <a:schemeClr val="tx1"/>
           </a:solidFill>
@@ -2888,13 +2888,13 @@
           <a:cs typeface="+mn-cs"/>
         </a:defRPr>
       </a:lvl3pPr>
-      <a:lvl4pPr marL="1600200" indent="-228600" algn="l" defTabSz="457200" rtl="0" eaLnBrk="1" latinLnBrk="0" hangingPunct="1">
+      <a:lvl4pPr marL="1454582" indent="-207797" algn="l" defTabSz="415595" rtl="0" eaLnBrk="1" latinLnBrk="0" hangingPunct="1">
         <a:spcBef>
           <a:spcPct val="20000"/>
         </a:spcBef>
         <a:buFont typeface="Arial"/>
         <a:buChar char="–"/>
-        <a:defRPr sz="2000" kern="1200">
+        <a:defRPr sz="1800" kern="1200">
           <a:solidFill>
             <a:schemeClr val="tx1"/>
           </a:solidFill>
@@ -2903,13 +2903,13 @@
           <a:cs typeface="+mn-cs"/>
         </a:defRPr>
       </a:lvl4pPr>
-      <a:lvl5pPr marL="2057400" indent="-228600" algn="l" defTabSz="457200" rtl="0" eaLnBrk="1" latinLnBrk="0" hangingPunct="1">
+      <a:lvl5pPr marL="1870177" indent="-207797" algn="l" defTabSz="415595" rtl="0" eaLnBrk="1" latinLnBrk="0" hangingPunct="1">
         <a:spcBef>
           <a:spcPct val="20000"/>
         </a:spcBef>
         <a:buFont typeface="Arial"/>
         <a:buChar char="»"/>
-        <a:defRPr sz="2000" kern="1200">
+        <a:defRPr sz="1800" kern="1200">
           <a:solidFill>
             <a:schemeClr val="tx1"/>
           </a:solidFill>
@@ -2918,13 +2918,13 @@
           <a:cs typeface="+mn-cs"/>
         </a:defRPr>
       </a:lvl5pPr>
-      <a:lvl6pPr marL="2514600" indent="-228600" algn="l" defTabSz="457200" rtl="0" eaLnBrk="1" latinLnBrk="0" hangingPunct="1">
+      <a:lvl6pPr marL="2285771" indent="-207797" algn="l" defTabSz="415595" rtl="0" eaLnBrk="1" latinLnBrk="0" hangingPunct="1">
         <a:spcBef>
           <a:spcPct val="20000"/>
         </a:spcBef>
         <a:buFont typeface="Arial"/>
         <a:buChar char="•"/>
-        <a:defRPr sz="2000" kern="1200">
+        <a:defRPr sz="1800" kern="1200">
           <a:solidFill>
             <a:schemeClr val="tx1"/>
           </a:solidFill>
@@ -2933,13 +2933,13 @@
           <a:cs typeface="+mn-cs"/>
         </a:defRPr>
       </a:lvl6pPr>
-      <a:lvl7pPr marL="2971800" indent="-228600" algn="l" defTabSz="457200" rtl="0" eaLnBrk="1" latinLnBrk="0" hangingPunct="1">
+      <a:lvl7pPr marL="2701366" indent="-207797" algn="l" defTabSz="415595" rtl="0" eaLnBrk="1" latinLnBrk="0" hangingPunct="1">
         <a:spcBef>
           <a:spcPct val="20000"/>
         </a:spcBef>
         <a:buFont typeface="Arial"/>
         <a:buChar char="•"/>
-        <a:defRPr sz="2000" kern="1200">
+        <a:defRPr sz="1800" kern="1200">
           <a:solidFill>
             <a:schemeClr val="tx1"/>
           </a:solidFill>
@@ -2948,13 +2948,13 @@
           <a:cs typeface="+mn-cs"/>
         </a:defRPr>
       </a:lvl7pPr>
-      <a:lvl8pPr marL="3429000" indent="-228600" algn="l" defTabSz="457200" rtl="0" eaLnBrk="1" latinLnBrk="0" hangingPunct="1">
+      <a:lvl8pPr marL="3116961" indent="-207797" algn="l" defTabSz="415595" rtl="0" eaLnBrk="1" latinLnBrk="0" hangingPunct="1">
         <a:spcBef>
           <a:spcPct val="20000"/>
         </a:spcBef>
         <a:buFont typeface="Arial"/>
         <a:buChar char="•"/>
-        <a:defRPr sz="2000" kern="1200">
+        <a:defRPr sz="1800" kern="1200">
           <a:solidFill>
             <a:schemeClr val="tx1"/>
           </a:solidFill>
@@ -2963,13 +2963,13 @@
           <a:cs typeface="+mn-cs"/>
         </a:defRPr>
       </a:lvl8pPr>
-      <a:lvl9pPr marL="3886200" indent="-228600" algn="l" defTabSz="457200" rtl="0" eaLnBrk="1" latinLnBrk="0" hangingPunct="1">
+      <a:lvl9pPr marL="3532556" indent="-207797" algn="l" defTabSz="415595" rtl="0" eaLnBrk="1" latinLnBrk="0" hangingPunct="1">
         <a:spcBef>
           <a:spcPct val="20000"/>
         </a:spcBef>
         <a:buFont typeface="Arial"/>
         <a:buChar char="•"/>
-        <a:defRPr sz="2000" kern="1200">
+        <a:defRPr sz="1800" kern="1200">
           <a:solidFill>
             <a:schemeClr val="tx1"/>
           </a:solidFill>
@@ -2983,8 +2983,8 @@
       <a:defPPr>
         <a:defRPr lang="en-US"/>
       </a:defPPr>
-      <a:lvl1pPr marL="0" algn="l" defTabSz="457200" rtl="0" eaLnBrk="1" latinLnBrk="0" hangingPunct="1">
-        <a:defRPr sz="1800" kern="1200">
+      <a:lvl1pPr marL="0" algn="l" defTabSz="415595" rtl="0" eaLnBrk="1" latinLnBrk="0" hangingPunct="1">
+        <a:defRPr sz="1600" kern="1200">
           <a:solidFill>
             <a:schemeClr val="tx1"/>
           </a:solidFill>
@@ -2993,8 +2993,8 @@
           <a:cs typeface="+mn-cs"/>
         </a:defRPr>
       </a:lvl1pPr>
-      <a:lvl2pPr marL="457200" algn="l" defTabSz="457200" rtl="0" eaLnBrk="1" latinLnBrk="0" hangingPunct="1">
-        <a:defRPr sz="1800" kern="1200">
+      <a:lvl2pPr marL="415595" algn="l" defTabSz="415595" rtl="0" eaLnBrk="1" latinLnBrk="0" hangingPunct="1">
+        <a:defRPr sz="1600" kern="1200">
           <a:solidFill>
             <a:schemeClr val="tx1"/>
           </a:solidFill>
@@ -3003,8 +3003,8 @@
           <a:cs typeface="+mn-cs"/>
         </a:defRPr>
       </a:lvl2pPr>
-      <a:lvl3pPr marL="914400" algn="l" defTabSz="457200" rtl="0" eaLnBrk="1" latinLnBrk="0" hangingPunct="1">
-        <a:defRPr sz="1800" kern="1200">
+      <a:lvl3pPr marL="831190" algn="l" defTabSz="415595" rtl="0" eaLnBrk="1" latinLnBrk="0" hangingPunct="1">
+        <a:defRPr sz="1600" kern="1200">
           <a:solidFill>
             <a:schemeClr val="tx1"/>
           </a:solidFill>
@@ -3013,8 +3013,8 @@
           <a:cs typeface="+mn-cs"/>
         </a:defRPr>
       </a:lvl3pPr>
-      <a:lvl4pPr marL="1371600" algn="l" defTabSz="457200" rtl="0" eaLnBrk="1" latinLnBrk="0" hangingPunct="1">
-        <a:defRPr sz="1800" kern="1200">
+      <a:lvl4pPr marL="1246784" algn="l" defTabSz="415595" rtl="0" eaLnBrk="1" latinLnBrk="0" hangingPunct="1">
+        <a:defRPr sz="1600" kern="1200">
           <a:solidFill>
             <a:schemeClr val="tx1"/>
           </a:solidFill>
@@ -3023,8 +3023,8 @@
           <a:cs typeface="+mn-cs"/>
         </a:defRPr>
       </a:lvl4pPr>
-      <a:lvl5pPr marL="1828800" algn="l" defTabSz="457200" rtl="0" eaLnBrk="1" latinLnBrk="0" hangingPunct="1">
-        <a:defRPr sz="1800" kern="1200">
+      <a:lvl5pPr marL="1662379" algn="l" defTabSz="415595" rtl="0" eaLnBrk="1" latinLnBrk="0" hangingPunct="1">
+        <a:defRPr sz="1600" kern="1200">
           <a:solidFill>
             <a:schemeClr val="tx1"/>
           </a:solidFill>
@@ -3033,8 +3033,8 @@
           <a:cs typeface="+mn-cs"/>
         </a:defRPr>
       </a:lvl5pPr>
-      <a:lvl6pPr marL="2286000" algn="l" defTabSz="457200" rtl="0" eaLnBrk="1" latinLnBrk="0" hangingPunct="1">
-        <a:defRPr sz="1800" kern="1200">
+      <a:lvl6pPr marL="2077974" algn="l" defTabSz="415595" rtl="0" eaLnBrk="1" latinLnBrk="0" hangingPunct="1">
+        <a:defRPr sz="1600" kern="1200">
           <a:solidFill>
             <a:schemeClr val="tx1"/>
           </a:solidFill>
@@ -3043,8 +3043,8 @@
           <a:cs typeface="+mn-cs"/>
         </a:defRPr>
       </a:lvl6pPr>
-      <a:lvl7pPr marL="2743200" algn="l" defTabSz="457200" rtl="0" eaLnBrk="1" latinLnBrk="0" hangingPunct="1">
-        <a:defRPr sz="1800" kern="1200">
+      <a:lvl7pPr marL="2493569" algn="l" defTabSz="415595" rtl="0" eaLnBrk="1" latinLnBrk="0" hangingPunct="1">
+        <a:defRPr sz="1600" kern="1200">
           <a:solidFill>
             <a:schemeClr val="tx1"/>
           </a:solidFill>
@@ -3053,8 +3053,8 @@
           <a:cs typeface="+mn-cs"/>
         </a:defRPr>
       </a:lvl7pPr>
-      <a:lvl8pPr marL="3200400" algn="l" defTabSz="457200" rtl="0" eaLnBrk="1" latinLnBrk="0" hangingPunct="1">
-        <a:defRPr sz="1800" kern="1200">
+      <a:lvl8pPr marL="2909164" algn="l" defTabSz="415595" rtl="0" eaLnBrk="1" latinLnBrk="0" hangingPunct="1">
+        <a:defRPr sz="1600" kern="1200">
           <a:solidFill>
             <a:schemeClr val="tx1"/>
           </a:solidFill>
@@ -3063,8 +3063,8 @@
           <a:cs typeface="+mn-cs"/>
         </a:defRPr>
       </a:lvl8pPr>
-      <a:lvl9pPr marL="3657600" algn="l" defTabSz="457200" rtl="0" eaLnBrk="1" latinLnBrk="0" hangingPunct="1">
-        <a:defRPr sz="1800" kern="1200">
+      <a:lvl9pPr marL="3324758" algn="l" defTabSz="415595" rtl="0" eaLnBrk="1" latinLnBrk="0" hangingPunct="1">
+        <a:defRPr sz="1600" kern="1200">
           <a:solidFill>
             <a:schemeClr val="tx1"/>
           </a:solidFill>
@@ -3095,15 +3095,765 @@
           <a:chExt cx="0" cy="0"/>
         </a:xfrm>
       </p:grpSpPr>
-      <p:sp>
-        <p:nvSpPr>
-          <p:cNvPr id="4" name="Oval 3"/>
+      <p:cxnSp>
+        <p:nvCxnSpPr>
+          <p:cNvPr id="333" name="Straight Connector 332"/>
+          <p:cNvCxnSpPr/>
+          <p:nvPr/>
+        </p:nvCxnSpPr>
+        <p:spPr>
+          <a:xfrm>
+            <a:off x="4111739" y="2349220"/>
+            <a:ext cx="0" cy="711128"/>
+          </a:xfrm>
+          <a:prstGeom prst="line">
+            <a:avLst/>
+          </a:prstGeom>
+        </p:spPr>
+        <p:style>
+          <a:lnRef idx="2">
+            <a:schemeClr val="accent1"/>
+          </a:lnRef>
+          <a:fillRef idx="0">
+            <a:schemeClr val="accent1"/>
+          </a:fillRef>
+          <a:effectRef idx="1">
+            <a:schemeClr val="accent1"/>
+          </a:effectRef>
+          <a:fontRef idx="minor">
+            <a:schemeClr val="tx1"/>
+          </a:fontRef>
+        </p:style>
+      </p:cxnSp>
+      <p:cxnSp>
+        <p:nvCxnSpPr>
+          <p:cNvPr id="334" name="Straight Connector 333"/>
+          <p:cNvCxnSpPr/>
+          <p:nvPr/>
+        </p:nvCxnSpPr>
+        <p:spPr>
+          <a:xfrm flipH="1" flipV="1">
+            <a:off x="6551318" y="2361460"/>
+            <a:ext cx="743857" cy="357738"/>
+          </a:xfrm>
+          <a:prstGeom prst="line">
+            <a:avLst/>
+          </a:prstGeom>
+        </p:spPr>
+        <p:style>
+          <a:lnRef idx="2">
+            <a:schemeClr val="accent1"/>
+          </a:lnRef>
+          <a:fillRef idx="0">
+            <a:schemeClr val="accent1"/>
+          </a:fillRef>
+          <a:effectRef idx="1">
+            <a:schemeClr val="accent1"/>
+          </a:effectRef>
+          <a:fontRef idx="minor">
+            <a:schemeClr val="tx1"/>
+          </a:fontRef>
+        </p:style>
+      </p:cxnSp>
+      <p:cxnSp>
+        <p:nvCxnSpPr>
+          <p:cNvPr id="335" name="Straight Connector 334"/>
+          <p:cNvCxnSpPr/>
+          <p:nvPr/>
+        </p:nvCxnSpPr>
+        <p:spPr>
+          <a:xfrm flipH="1">
+            <a:off x="6551318" y="2719199"/>
+            <a:ext cx="743857" cy="341148"/>
+          </a:xfrm>
+          <a:prstGeom prst="line">
+            <a:avLst/>
+          </a:prstGeom>
+        </p:spPr>
+        <p:style>
+          <a:lnRef idx="2">
+            <a:schemeClr val="accent1"/>
+          </a:lnRef>
+          <a:fillRef idx="0">
+            <a:schemeClr val="accent1"/>
+          </a:fillRef>
+          <a:effectRef idx="1">
+            <a:schemeClr val="accent1"/>
+          </a:effectRef>
+          <a:fontRef idx="minor">
+            <a:schemeClr val="tx1"/>
+          </a:fontRef>
+        </p:style>
+      </p:cxnSp>
+      <p:cxnSp>
+        <p:nvCxnSpPr>
+          <p:cNvPr id="336" name="Straight Connector 335"/>
+          <p:cNvCxnSpPr/>
+          <p:nvPr/>
+        </p:nvCxnSpPr>
+        <p:spPr>
+          <a:xfrm>
+            <a:off x="5147118" y="2009365"/>
+            <a:ext cx="1404198" cy="352095"/>
+          </a:xfrm>
+          <a:prstGeom prst="line">
+            <a:avLst/>
+          </a:prstGeom>
+        </p:spPr>
+        <p:style>
+          <a:lnRef idx="2">
+            <a:schemeClr val="accent1"/>
+          </a:lnRef>
+          <a:fillRef idx="0">
+            <a:schemeClr val="accent1"/>
+          </a:fillRef>
+          <a:effectRef idx="1">
+            <a:schemeClr val="accent1"/>
+          </a:effectRef>
+          <a:fontRef idx="minor">
+            <a:schemeClr val="tx1"/>
+          </a:fontRef>
+        </p:style>
+      </p:cxnSp>
+      <p:cxnSp>
+        <p:nvCxnSpPr>
+          <p:cNvPr id="337" name="Straight Connector 336"/>
+          <p:cNvCxnSpPr/>
+          <p:nvPr/>
+        </p:nvCxnSpPr>
+        <p:spPr>
+          <a:xfrm flipH="1">
+            <a:off x="5147119" y="3060348"/>
+            <a:ext cx="1404197" cy="349525"/>
+          </a:xfrm>
+          <a:prstGeom prst="line">
+            <a:avLst/>
+          </a:prstGeom>
+        </p:spPr>
+        <p:style>
+          <a:lnRef idx="2">
+            <a:schemeClr val="accent1"/>
+          </a:lnRef>
+          <a:fillRef idx="0">
+            <a:schemeClr val="accent1"/>
+          </a:fillRef>
+          <a:effectRef idx="1">
+            <a:schemeClr val="accent1"/>
+          </a:effectRef>
+          <a:fontRef idx="minor">
+            <a:schemeClr val="tx1"/>
+          </a:fontRef>
+        </p:style>
+      </p:cxnSp>
+      <p:cxnSp>
+        <p:nvCxnSpPr>
+          <p:cNvPr id="338" name="Straight Connector 337"/>
+          <p:cNvCxnSpPr/>
+          <p:nvPr/>
+        </p:nvCxnSpPr>
+        <p:spPr>
+          <a:xfrm flipH="1">
+            <a:off x="5147118" y="2361460"/>
+            <a:ext cx="1404198" cy="357738"/>
+          </a:xfrm>
+          <a:prstGeom prst="line">
+            <a:avLst/>
+          </a:prstGeom>
+        </p:spPr>
+        <p:style>
+          <a:lnRef idx="2">
+            <a:schemeClr val="accent1"/>
+          </a:lnRef>
+          <a:fillRef idx="0">
+            <a:schemeClr val="accent1"/>
+          </a:fillRef>
+          <a:effectRef idx="1">
+            <a:schemeClr val="accent1"/>
+          </a:effectRef>
+          <a:fontRef idx="minor">
+            <a:schemeClr val="tx1"/>
+          </a:fontRef>
+        </p:style>
+      </p:cxnSp>
+      <p:cxnSp>
+        <p:nvCxnSpPr>
+          <p:cNvPr id="339" name="Straight Connector 338"/>
+          <p:cNvCxnSpPr/>
+          <p:nvPr/>
+        </p:nvCxnSpPr>
+        <p:spPr>
+          <a:xfrm flipH="1" flipV="1">
+            <a:off x="5147118" y="2719199"/>
+            <a:ext cx="1404198" cy="341148"/>
+          </a:xfrm>
+          <a:prstGeom prst="line">
+            <a:avLst/>
+          </a:prstGeom>
+        </p:spPr>
+        <p:style>
+          <a:lnRef idx="2">
+            <a:schemeClr val="accent1"/>
+          </a:lnRef>
+          <a:fillRef idx="0">
+            <a:schemeClr val="accent1"/>
+          </a:fillRef>
+          <a:effectRef idx="1">
+            <a:schemeClr val="accent1"/>
+          </a:effectRef>
+          <a:fontRef idx="minor">
+            <a:schemeClr val="tx1"/>
+          </a:fontRef>
+        </p:style>
+      </p:cxnSp>
+      <p:cxnSp>
+        <p:nvCxnSpPr>
+          <p:cNvPr id="340" name="Straight Connector 339"/>
+          <p:cNvCxnSpPr/>
+          <p:nvPr/>
+        </p:nvCxnSpPr>
+        <p:spPr>
+          <a:xfrm flipH="1" flipV="1">
+            <a:off x="4108905" y="1691672"/>
+            <a:ext cx="1038215" cy="317694"/>
+          </a:xfrm>
+          <a:prstGeom prst="line">
+            <a:avLst/>
+          </a:prstGeom>
+        </p:spPr>
+        <p:style>
+          <a:lnRef idx="2">
+            <a:schemeClr val="accent1"/>
+          </a:lnRef>
+          <a:fillRef idx="0">
+            <a:schemeClr val="accent1"/>
+          </a:fillRef>
+          <a:effectRef idx="1">
+            <a:schemeClr val="accent1"/>
+          </a:effectRef>
+          <a:fontRef idx="minor">
+            <a:schemeClr val="tx1"/>
+          </a:fontRef>
+        </p:style>
+      </p:cxnSp>
+      <p:cxnSp>
+        <p:nvCxnSpPr>
+          <p:cNvPr id="341" name="Straight Connector 340"/>
+          <p:cNvCxnSpPr/>
+          <p:nvPr/>
+        </p:nvCxnSpPr>
+        <p:spPr>
+          <a:xfrm flipH="1">
+            <a:off x="4103935" y="2009365"/>
+            <a:ext cx="1043185" cy="352095"/>
+          </a:xfrm>
+          <a:prstGeom prst="line">
+            <a:avLst/>
+          </a:prstGeom>
+        </p:spPr>
+        <p:style>
+          <a:lnRef idx="2">
+            <a:schemeClr val="accent1"/>
+          </a:lnRef>
+          <a:fillRef idx="0">
+            <a:schemeClr val="accent1"/>
+          </a:fillRef>
+          <a:effectRef idx="1">
+            <a:schemeClr val="accent1"/>
+          </a:effectRef>
+          <a:fontRef idx="minor">
+            <a:schemeClr val="tx1"/>
+          </a:fontRef>
+        </p:style>
+      </p:cxnSp>
+      <p:cxnSp>
+        <p:nvCxnSpPr>
+          <p:cNvPr id="342" name="Straight Connector 341"/>
+          <p:cNvCxnSpPr/>
+          <p:nvPr/>
+        </p:nvCxnSpPr>
+        <p:spPr>
+          <a:xfrm flipH="1" flipV="1">
+            <a:off x="4103935" y="2361460"/>
+            <a:ext cx="1043185" cy="357738"/>
+          </a:xfrm>
+          <a:prstGeom prst="line">
+            <a:avLst/>
+          </a:prstGeom>
+        </p:spPr>
+        <p:style>
+          <a:lnRef idx="2">
+            <a:schemeClr val="accent1"/>
+          </a:lnRef>
+          <a:fillRef idx="0">
+            <a:schemeClr val="accent1"/>
+          </a:fillRef>
+          <a:effectRef idx="1">
+            <a:schemeClr val="accent1"/>
+          </a:effectRef>
+          <a:fontRef idx="minor">
+            <a:schemeClr val="tx1"/>
+          </a:fontRef>
+        </p:style>
+      </p:cxnSp>
+      <p:cxnSp>
+        <p:nvCxnSpPr>
+          <p:cNvPr id="343" name="Straight Connector 342"/>
+          <p:cNvCxnSpPr/>
+          <p:nvPr/>
+        </p:nvCxnSpPr>
+        <p:spPr>
+          <a:xfrm flipH="1">
+            <a:off x="5101241" y="2719198"/>
+            <a:ext cx="45878" cy="690674"/>
+          </a:xfrm>
+          <a:prstGeom prst="line">
+            <a:avLst/>
+          </a:prstGeom>
+        </p:spPr>
+        <p:style>
+          <a:lnRef idx="2">
+            <a:schemeClr val="accent1"/>
+          </a:lnRef>
+          <a:fillRef idx="0">
+            <a:schemeClr val="accent1"/>
+          </a:fillRef>
+          <a:effectRef idx="1">
+            <a:schemeClr val="accent1"/>
+          </a:effectRef>
+          <a:fontRef idx="minor">
+            <a:schemeClr val="tx1"/>
+          </a:fontRef>
+        </p:style>
+      </p:cxnSp>
+      <p:cxnSp>
+        <p:nvCxnSpPr>
+          <p:cNvPr id="344" name="Straight Connector 343"/>
+          <p:cNvCxnSpPr/>
+          <p:nvPr/>
+        </p:nvCxnSpPr>
+        <p:spPr>
+          <a:xfrm flipH="1" flipV="1">
+            <a:off x="4103935" y="3060348"/>
+            <a:ext cx="1043185" cy="349525"/>
+          </a:xfrm>
+          <a:prstGeom prst="line">
+            <a:avLst/>
+          </a:prstGeom>
+        </p:spPr>
+        <p:style>
+          <a:lnRef idx="2">
+            <a:schemeClr val="accent1"/>
+          </a:lnRef>
+          <a:fillRef idx="0">
+            <a:schemeClr val="accent1"/>
+          </a:fillRef>
+          <a:effectRef idx="1">
+            <a:schemeClr val="accent1"/>
+          </a:effectRef>
+          <a:fontRef idx="minor">
+            <a:schemeClr val="tx1"/>
+          </a:fontRef>
+        </p:style>
+      </p:cxnSp>
+      <p:cxnSp>
+        <p:nvCxnSpPr>
+          <p:cNvPr id="345" name="Straight Connector 344"/>
+          <p:cNvCxnSpPr/>
+          <p:nvPr/>
+        </p:nvCxnSpPr>
+        <p:spPr>
+          <a:xfrm flipH="1">
+            <a:off x="4108905" y="3409873"/>
+            <a:ext cx="1038215" cy="331017"/>
+          </a:xfrm>
+          <a:prstGeom prst="line">
+            <a:avLst/>
+          </a:prstGeom>
+        </p:spPr>
+        <p:style>
+          <a:lnRef idx="2">
+            <a:schemeClr val="accent1"/>
+          </a:lnRef>
+          <a:fillRef idx="0">
+            <a:schemeClr val="accent1"/>
+          </a:fillRef>
+          <a:effectRef idx="1">
+            <a:schemeClr val="accent1"/>
+          </a:effectRef>
+          <a:fontRef idx="minor">
+            <a:schemeClr val="tx1"/>
+          </a:fontRef>
+        </p:style>
+      </p:cxnSp>
+      <p:cxnSp>
+        <p:nvCxnSpPr>
+          <p:cNvPr id="346" name="Straight Connector 345"/>
+          <p:cNvCxnSpPr/>
+          <p:nvPr/>
+        </p:nvCxnSpPr>
+        <p:spPr>
+          <a:xfrm flipV="1">
+            <a:off x="917665" y="2349220"/>
+            <a:ext cx="743857" cy="357738"/>
+          </a:xfrm>
+          <a:prstGeom prst="line">
+            <a:avLst/>
+          </a:prstGeom>
+        </p:spPr>
+        <p:style>
+          <a:lnRef idx="2">
+            <a:schemeClr val="accent1"/>
+          </a:lnRef>
+          <a:fillRef idx="0">
+            <a:schemeClr val="accent1"/>
+          </a:fillRef>
+          <a:effectRef idx="1">
+            <a:schemeClr val="accent1"/>
+          </a:effectRef>
+          <a:fontRef idx="minor">
+            <a:schemeClr val="tx1"/>
+          </a:fontRef>
+        </p:style>
+      </p:cxnSp>
+      <p:cxnSp>
+        <p:nvCxnSpPr>
+          <p:cNvPr id="347" name="Straight Connector 346"/>
+          <p:cNvCxnSpPr/>
+          <p:nvPr/>
+        </p:nvCxnSpPr>
+        <p:spPr>
+          <a:xfrm>
+            <a:off x="917665" y="2706959"/>
+            <a:ext cx="743857" cy="341148"/>
+          </a:xfrm>
+          <a:prstGeom prst="line">
+            <a:avLst/>
+          </a:prstGeom>
+        </p:spPr>
+        <p:style>
+          <a:lnRef idx="2">
+            <a:schemeClr val="accent1"/>
+          </a:lnRef>
+          <a:fillRef idx="0">
+            <a:schemeClr val="accent1"/>
+          </a:fillRef>
+          <a:effectRef idx="1">
+            <a:schemeClr val="accent1"/>
+          </a:effectRef>
+          <a:fontRef idx="minor">
+            <a:schemeClr val="tx1"/>
+          </a:fontRef>
+        </p:style>
+      </p:cxnSp>
+      <p:cxnSp>
+        <p:nvCxnSpPr>
+          <p:cNvPr id="348" name="Straight Connector 347"/>
+          <p:cNvCxnSpPr/>
+          <p:nvPr/>
+        </p:nvCxnSpPr>
+        <p:spPr>
+          <a:xfrm flipH="1">
+            <a:off x="1661520" y="1997125"/>
+            <a:ext cx="1404198" cy="352095"/>
+          </a:xfrm>
+          <a:prstGeom prst="line">
+            <a:avLst/>
+          </a:prstGeom>
+        </p:spPr>
+        <p:style>
+          <a:lnRef idx="2">
+            <a:schemeClr val="accent1"/>
+          </a:lnRef>
+          <a:fillRef idx="0">
+            <a:schemeClr val="accent1"/>
+          </a:fillRef>
+          <a:effectRef idx="1">
+            <a:schemeClr val="accent1"/>
+          </a:effectRef>
+          <a:fontRef idx="minor">
+            <a:schemeClr val="tx1"/>
+          </a:fontRef>
+        </p:style>
+      </p:cxnSp>
+      <p:cxnSp>
+        <p:nvCxnSpPr>
+          <p:cNvPr id="349" name="Straight Connector 348"/>
+          <p:cNvCxnSpPr/>
+          <p:nvPr/>
+        </p:nvCxnSpPr>
+        <p:spPr>
+          <a:xfrm>
+            <a:off x="1661523" y="3048108"/>
+            <a:ext cx="1404197" cy="349525"/>
+          </a:xfrm>
+          <a:prstGeom prst="line">
+            <a:avLst/>
+          </a:prstGeom>
+        </p:spPr>
+        <p:style>
+          <a:lnRef idx="2">
+            <a:schemeClr val="accent1"/>
+          </a:lnRef>
+          <a:fillRef idx="0">
+            <a:schemeClr val="accent1"/>
+          </a:fillRef>
+          <a:effectRef idx="1">
+            <a:schemeClr val="accent1"/>
+          </a:effectRef>
+          <a:fontRef idx="minor">
+            <a:schemeClr val="tx1"/>
+          </a:fontRef>
+        </p:style>
+      </p:cxnSp>
+      <p:cxnSp>
+        <p:nvCxnSpPr>
+          <p:cNvPr id="350" name="Straight Connector 349"/>
+          <p:cNvCxnSpPr/>
+          <p:nvPr/>
+        </p:nvCxnSpPr>
+        <p:spPr>
+          <a:xfrm>
+            <a:off x="1661520" y="2349220"/>
+            <a:ext cx="1404198" cy="357738"/>
+          </a:xfrm>
+          <a:prstGeom prst="line">
+            <a:avLst/>
+          </a:prstGeom>
+        </p:spPr>
+        <p:style>
+          <a:lnRef idx="2">
+            <a:schemeClr val="accent1"/>
+          </a:lnRef>
+          <a:fillRef idx="0">
+            <a:schemeClr val="accent1"/>
+          </a:fillRef>
+          <a:effectRef idx="1">
+            <a:schemeClr val="accent1"/>
+          </a:effectRef>
+          <a:fontRef idx="minor">
+            <a:schemeClr val="tx1"/>
+          </a:fontRef>
+        </p:style>
+      </p:cxnSp>
+      <p:cxnSp>
+        <p:nvCxnSpPr>
+          <p:cNvPr id="351" name="Straight Connector 350"/>
+          <p:cNvCxnSpPr/>
+          <p:nvPr/>
+        </p:nvCxnSpPr>
+        <p:spPr>
+          <a:xfrm flipV="1">
+            <a:off x="1661520" y="2706959"/>
+            <a:ext cx="1404198" cy="341148"/>
+          </a:xfrm>
+          <a:prstGeom prst="line">
+            <a:avLst/>
+          </a:prstGeom>
+        </p:spPr>
+        <p:style>
+          <a:lnRef idx="2">
+            <a:schemeClr val="accent1"/>
+          </a:lnRef>
+          <a:fillRef idx="0">
+            <a:schemeClr val="accent1"/>
+          </a:fillRef>
+          <a:effectRef idx="1">
+            <a:schemeClr val="accent1"/>
+          </a:effectRef>
+          <a:fontRef idx="minor">
+            <a:schemeClr val="tx1"/>
+          </a:fontRef>
+        </p:style>
+      </p:cxnSp>
+      <p:cxnSp>
+        <p:nvCxnSpPr>
+          <p:cNvPr id="352" name="Straight Connector 351"/>
+          <p:cNvCxnSpPr/>
+          <p:nvPr/>
+        </p:nvCxnSpPr>
+        <p:spPr>
+          <a:xfrm flipV="1">
+            <a:off x="3065720" y="1679432"/>
+            <a:ext cx="1038215" cy="317694"/>
+          </a:xfrm>
+          <a:prstGeom prst="line">
+            <a:avLst/>
+          </a:prstGeom>
+        </p:spPr>
+        <p:style>
+          <a:lnRef idx="2">
+            <a:schemeClr val="accent1"/>
+          </a:lnRef>
+          <a:fillRef idx="0">
+            <a:schemeClr val="accent1"/>
+          </a:fillRef>
+          <a:effectRef idx="1">
+            <a:schemeClr val="accent1"/>
+          </a:effectRef>
+          <a:fontRef idx="minor">
+            <a:schemeClr val="tx1"/>
+          </a:fontRef>
+        </p:style>
+      </p:cxnSp>
+      <p:cxnSp>
+        <p:nvCxnSpPr>
+          <p:cNvPr id="353" name="Straight Connector 352"/>
+          <p:cNvCxnSpPr/>
+          <p:nvPr/>
+        </p:nvCxnSpPr>
+        <p:spPr>
+          <a:xfrm>
+            <a:off x="3065720" y="1997125"/>
+            <a:ext cx="1043185" cy="352095"/>
+          </a:xfrm>
+          <a:prstGeom prst="line">
+            <a:avLst/>
+          </a:prstGeom>
+        </p:spPr>
+        <p:style>
+          <a:lnRef idx="2">
+            <a:schemeClr val="accent1"/>
+          </a:lnRef>
+          <a:fillRef idx="0">
+            <a:schemeClr val="accent1"/>
+          </a:fillRef>
+          <a:effectRef idx="1">
+            <a:schemeClr val="accent1"/>
+          </a:effectRef>
+          <a:fontRef idx="minor">
+            <a:schemeClr val="tx1"/>
+          </a:fontRef>
+        </p:style>
+      </p:cxnSp>
+      <p:cxnSp>
+        <p:nvCxnSpPr>
+          <p:cNvPr id="354" name="Straight Connector 353"/>
+          <p:cNvCxnSpPr/>
+          <p:nvPr/>
+        </p:nvCxnSpPr>
+        <p:spPr>
+          <a:xfrm flipV="1">
+            <a:off x="3065718" y="1997124"/>
+            <a:ext cx="0" cy="709835"/>
+          </a:xfrm>
+          <a:prstGeom prst="line">
+            <a:avLst/>
+          </a:prstGeom>
+        </p:spPr>
+        <p:style>
+          <a:lnRef idx="2">
+            <a:schemeClr val="accent1"/>
+          </a:lnRef>
+          <a:fillRef idx="0">
+            <a:schemeClr val="accent1"/>
+          </a:fillRef>
+          <a:effectRef idx="1">
+            <a:schemeClr val="accent1"/>
+          </a:effectRef>
+          <a:fontRef idx="minor">
+            <a:schemeClr val="tx1"/>
+          </a:fontRef>
+        </p:style>
+      </p:cxnSp>
+      <p:cxnSp>
+        <p:nvCxnSpPr>
+          <p:cNvPr id="355" name="Straight Connector 354"/>
+          <p:cNvCxnSpPr/>
+          <p:nvPr/>
+        </p:nvCxnSpPr>
+        <p:spPr>
+          <a:xfrm>
+            <a:off x="3065720" y="2706959"/>
+            <a:ext cx="1038215" cy="341148"/>
+          </a:xfrm>
+          <a:prstGeom prst="line">
+            <a:avLst/>
+          </a:prstGeom>
+        </p:spPr>
+        <p:style>
+          <a:lnRef idx="2">
+            <a:schemeClr val="accent1"/>
+          </a:lnRef>
+          <a:fillRef idx="0">
+            <a:schemeClr val="accent1"/>
+          </a:fillRef>
+          <a:effectRef idx="1">
+            <a:schemeClr val="accent1"/>
+          </a:effectRef>
+          <a:fontRef idx="minor">
+            <a:schemeClr val="tx1"/>
+          </a:fontRef>
+        </p:style>
+      </p:cxnSp>
+      <p:cxnSp>
+        <p:nvCxnSpPr>
+          <p:cNvPr id="356" name="Straight Connector 355"/>
+          <p:cNvCxnSpPr/>
+          <p:nvPr/>
+        </p:nvCxnSpPr>
+        <p:spPr>
+          <a:xfrm flipV="1">
+            <a:off x="3065720" y="3048108"/>
+            <a:ext cx="1043185" cy="349525"/>
+          </a:xfrm>
+          <a:prstGeom prst="line">
+            <a:avLst/>
+          </a:prstGeom>
+        </p:spPr>
+        <p:style>
+          <a:lnRef idx="2">
+            <a:schemeClr val="accent1"/>
+          </a:lnRef>
+          <a:fillRef idx="0">
+            <a:schemeClr val="accent1"/>
+          </a:fillRef>
+          <a:effectRef idx="1">
+            <a:schemeClr val="accent1"/>
+          </a:effectRef>
+          <a:fontRef idx="minor">
+            <a:schemeClr val="tx1"/>
+          </a:fontRef>
+        </p:style>
+      </p:cxnSp>
+      <p:cxnSp>
+        <p:nvCxnSpPr>
+          <p:cNvPr id="357" name="Straight Connector 356"/>
+          <p:cNvCxnSpPr/>
+          <p:nvPr/>
+        </p:nvCxnSpPr>
+        <p:spPr>
+          <a:xfrm>
+            <a:off x="3065720" y="3397633"/>
+            <a:ext cx="1038215" cy="331017"/>
+          </a:xfrm>
+          <a:prstGeom prst="line">
+            <a:avLst/>
+          </a:prstGeom>
+        </p:spPr>
+        <p:style>
+          <a:lnRef idx="2">
+            <a:schemeClr val="accent1"/>
+          </a:lnRef>
+          <a:fillRef idx="0">
+            <a:schemeClr val="accent1"/>
+          </a:fillRef>
+          <a:effectRef idx="1">
+            <a:schemeClr val="accent1"/>
+          </a:effectRef>
+          <a:fontRef idx="minor">
+            <a:schemeClr val="tx1"/>
+          </a:fontRef>
+        </p:style>
+      </p:cxnSp>
+      <p:sp>
+        <p:nvSpPr>
+          <p:cNvPr id="358" name="Oval 357"/>
           <p:cNvSpPr/>
           <p:nvPr/>
         </p:nvSpPr>
         <p:spPr>
           <a:xfrm>
-            <a:off x="1162633" y="3006886"/>
+            <a:off x="768769" y="2525267"/>
             <a:ext cx="352055" cy="352095"/>
           </a:xfrm>
           <a:prstGeom prst="ellipse">
@@ -3155,14 +3905,14 @@
       </p:sp>
       <p:sp>
         <p:nvSpPr>
-          <p:cNvPr id="5" name="Oval 4"/>
+          <p:cNvPr id="359" name="Oval 358"/>
           <p:cNvSpPr/>
           <p:nvPr/>
         </p:nvSpPr>
         <p:spPr>
           <a:xfrm>
-            <a:off x="1781901" y="1724254"/>
-            <a:ext cx="1562187" cy="3237267"/>
+            <a:off x="447600" y="1821077"/>
+            <a:ext cx="1704311" cy="1755173"/>
           </a:xfrm>
           <a:prstGeom prst="ellipse">
             <a:avLst/>
@@ -3200,13 +3950,13 @@
       </p:sp>
       <p:sp>
         <p:nvSpPr>
-          <p:cNvPr id="7" name="Oval 6"/>
+          <p:cNvPr id="360" name="Oval 359"/>
           <p:cNvSpPr/>
           <p:nvPr/>
         </p:nvSpPr>
         <p:spPr>
           <a:xfrm>
-            <a:off x="2113850" y="2565267"/>
+            <a:off x="1472879" y="2872060"/>
             <a:ext cx="352055" cy="352095"/>
           </a:xfrm>
           <a:prstGeom prst="ellipse">
@@ -3258,13 +4008,13 @@
       </p:sp>
       <p:sp>
         <p:nvSpPr>
-          <p:cNvPr id="8" name="Oval 7"/>
+          <p:cNvPr id="361" name="Oval 360"/>
           <p:cNvSpPr/>
           <p:nvPr/>
         </p:nvSpPr>
         <p:spPr>
           <a:xfrm>
-            <a:off x="1937822" y="3723654"/>
+            <a:off x="1472879" y="2173172"/>
             <a:ext cx="352055" cy="352095"/>
           </a:xfrm>
           <a:prstGeom prst="ellipse">
@@ -3314,198 +4064,29 @@
           </a:p>
         </p:txBody>
       </p:sp>
-      <p:sp>
-        <p:nvSpPr>
-          <p:cNvPr id="11" name="Oval 10"/>
-          <p:cNvSpPr/>
-          <p:nvPr/>
-        </p:nvSpPr>
-        <p:spPr>
-          <a:xfrm>
-            <a:off x="2289877" y="3168857"/>
-            <a:ext cx="352055" cy="352095"/>
-          </a:xfrm>
-          <a:prstGeom prst="ellipse">
-            <a:avLst/>
-          </a:prstGeom>
-          <a:solidFill>
-            <a:schemeClr val="accent3">
-              <a:lumMod val="40000"/>
-              <a:lumOff val="60000"/>
-            </a:schemeClr>
-          </a:solidFill>
-          <a:ln>
-            <a:solidFill>
-              <a:schemeClr val="tx1"/>
-            </a:solidFill>
-          </a:ln>
-        </p:spPr>
-        <p:style>
-          <a:lnRef idx="1">
-            <a:schemeClr val="accent1"/>
-          </a:lnRef>
-          <a:fillRef idx="3">
-            <a:schemeClr val="accent1"/>
-          </a:fillRef>
-          <a:effectRef idx="2">
-            <a:schemeClr val="accent1"/>
-          </a:effectRef>
-          <a:fontRef idx="minor">
-            <a:schemeClr val="lt1"/>
-          </a:fontRef>
-        </p:style>
-        <p:txBody>
-          <a:bodyPr rtlCol="0" anchor="ctr"/>
-          <a:lstStyle/>
-          <a:p>
-            <a:pPr algn="ctr"/>
-            <a:endParaRPr lang="en-US">
-              <a:ln>
-                <a:solidFill>
-                  <a:srgbClr val="000000"/>
-                </a:solidFill>
-              </a:ln>
-              <a:solidFill>
-                <a:srgbClr val="000000"/>
-              </a:solidFill>
-            </a:endParaRPr>
-          </a:p>
-        </p:txBody>
-      </p:sp>
-      <p:cxnSp>
-        <p:nvCxnSpPr>
-          <p:cNvPr id="18" name="Straight Connector 17"/>
-          <p:cNvCxnSpPr>
-            <a:stCxn id="4" idx="7"/>
-          </p:cNvCxnSpPr>
-          <p:nvPr/>
-        </p:nvCxnSpPr>
-        <p:spPr>
-          <a:xfrm flipV="1">
-            <a:off x="1463131" y="2865799"/>
-            <a:ext cx="474691" cy="192650"/>
-          </a:xfrm>
-          <a:prstGeom prst="line">
-            <a:avLst/>
-          </a:prstGeom>
-          <a:ln>
-            <a:solidFill>
-              <a:srgbClr val="000000"/>
-            </a:solidFill>
-          </a:ln>
-        </p:spPr>
-        <p:style>
-          <a:lnRef idx="2">
-            <a:schemeClr val="accent1"/>
-          </a:lnRef>
-          <a:fillRef idx="0">
-            <a:schemeClr val="accent1"/>
-          </a:fillRef>
-          <a:effectRef idx="1">
-            <a:schemeClr val="accent1"/>
-          </a:effectRef>
-          <a:fontRef idx="minor">
-            <a:schemeClr val="tx1"/>
-          </a:fontRef>
-        </p:style>
-      </p:cxnSp>
-      <p:cxnSp>
-        <p:nvCxnSpPr>
-          <p:cNvPr id="21" name="Straight Connector 20"/>
-          <p:cNvCxnSpPr>
-            <a:stCxn id="4" idx="5"/>
-          </p:cNvCxnSpPr>
-          <p:nvPr/>
-        </p:nvCxnSpPr>
-        <p:spPr>
-          <a:xfrm>
-            <a:off x="1463131" y="3307418"/>
-            <a:ext cx="526248" cy="213534"/>
-          </a:xfrm>
-          <a:prstGeom prst="line">
-            <a:avLst/>
-          </a:prstGeom>
-          <a:ln>
-            <a:solidFill>
-              <a:srgbClr val="000000"/>
-            </a:solidFill>
-          </a:ln>
-        </p:spPr>
-        <p:style>
-          <a:lnRef idx="2">
-            <a:schemeClr val="accent1"/>
-          </a:lnRef>
-          <a:fillRef idx="0">
-            <a:schemeClr val="accent1"/>
-          </a:fillRef>
-          <a:effectRef idx="1">
-            <a:schemeClr val="accent1"/>
-          </a:effectRef>
-          <a:fontRef idx="minor">
-            <a:schemeClr val="tx1"/>
-          </a:fontRef>
-        </p:style>
-      </p:cxnSp>
-      <p:cxnSp>
-        <p:nvCxnSpPr>
-          <p:cNvPr id="24" name="Straight Connector 23"/>
-          <p:cNvCxnSpPr>
-            <a:stCxn id="4" idx="6"/>
-          </p:cNvCxnSpPr>
-          <p:nvPr/>
-        </p:nvCxnSpPr>
-        <p:spPr>
-          <a:xfrm>
-            <a:off x="1514688" y="3182934"/>
-            <a:ext cx="599162" cy="37486"/>
-          </a:xfrm>
-          <a:prstGeom prst="line">
-            <a:avLst/>
-          </a:prstGeom>
-          <a:ln>
-            <a:solidFill>
-              <a:srgbClr val="000000"/>
-            </a:solidFill>
-          </a:ln>
-        </p:spPr>
-        <p:style>
-          <a:lnRef idx="2">
-            <a:schemeClr val="accent1"/>
-          </a:lnRef>
-          <a:fillRef idx="0">
-            <a:schemeClr val="accent1"/>
-          </a:fillRef>
-          <a:effectRef idx="1">
-            <a:schemeClr val="accent1"/>
-          </a:effectRef>
-          <a:fontRef idx="minor">
-            <a:schemeClr val="tx1"/>
-          </a:fontRef>
-        </p:style>
-      </p:cxnSp>
       <p:grpSp>
         <p:nvGrpSpPr>
-          <p:cNvPr id="28" name="Group 27"/>
+          <p:cNvPr id="362" name="Group 361"/>
           <p:cNvGrpSpPr/>
           <p:nvPr/>
         </p:nvGrpSpPr>
         <p:grpSpPr>
           <a:xfrm>
-            <a:off x="3978017" y="2207633"/>
-            <a:ext cx="352055" cy="2302696"/>
-            <a:chOff x="3893877" y="2125148"/>
-            <a:chExt cx="352055" cy="2302696"/>
+            <a:off x="2645781" y="1679432"/>
+            <a:ext cx="839877" cy="2036978"/>
+            <a:chOff x="3328123" y="2281023"/>
+            <a:chExt cx="839877" cy="2036978"/>
           </a:xfrm>
         </p:grpSpPr>
         <p:sp>
           <p:nvSpPr>
-            <p:cNvPr id="10" name="Oval 9"/>
+            <p:cNvPr id="363" name="Oval 362"/>
             <p:cNvSpPr/>
             <p:nvPr/>
           </p:nvSpPr>
           <p:spPr>
             <a:xfrm>
-              <a:off x="3893877" y="2125148"/>
+              <a:off x="3567346" y="2422668"/>
               <a:ext cx="352055" cy="352095"/>
             </a:xfrm>
             <a:prstGeom prst="ellipse">
@@ -3557,13 +4138,13 @@
         </p:sp>
         <p:sp>
           <p:nvSpPr>
-            <p:cNvPr id="14" name="Oval 13"/>
+            <p:cNvPr id="364" name="Oval 363"/>
             <p:cNvSpPr/>
             <p:nvPr/>
           </p:nvSpPr>
           <p:spPr>
             <a:xfrm>
-              <a:off x="3893877" y="2868325"/>
+              <a:off x="3567346" y="3825746"/>
               <a:ext cx="352055" cy="352095"/>
             </a:xfrm>
             <a:prstGeom prst="ellipse">
@@ -3615,13 +4196,13 @@
         </p:sp>
         <p:sp>
           <p:nvSpPr>
-            <p:cNvPr id="15" name="Oval 14"/>
+            <p:cNvPr id="365" name="Oval 364"/>
             <p:cNvSpPr/>
             <p:nvPr/>
           </p:nvSpPr>
           <p:spPr>
             <a:xfrm>
-              <a:off x="3893877" y="4075749"/>
+              <a:off x="3567346" y="3121556"/>
               <a:ext cx="352055" cy="352095"/>
             </a:xfrm>
             <a:prstGeom prst="ellipse">
@@ -3673,13 +4254,498 @@
         </p:sp>
         <p:sp>
           <p:nvSpPr>
-            <p:cNvPr id="27" name="Oval 26"/>
+            <p:cNvPr id="366" name="Oval 365"/>
             <p:cNvSpPr/>
             <p:nvPr/>
           </p:nvSpPr>
           <p:spPr>
             <a:xfrm>
-              <a:off x="3893877" y="3523954"/>
+              <a:off x="3328123" y="2281023"/>
+              <a:ext cx="839877" cy="2036978"/>
+            </a:xfrm>
+            <a:prstGeom prst="ellipse">
+              <a:avLst/>
+            </a:prstGeom>
+            <a:noFill/>
+            <a:ln>
+              <a:solidFill>
+                <a:schemeClr val="tx1"/>
+              </a:solidFill>
+              <a:prstDash val="dash"/>
+            </a:ln>
+          </p:spPr>
+          <p:style>
+            <a:lnRef idx="1">
+              <a:schemeClr val="accent1"/>
+            </a:lnRef>
+            <a:fillRef idx="3">
+              <a:schemeClr val="accent1"/>
+            </a:fillRef>
+            <a:effectRef idx="2">
+              <a:schemeClr val="accent1"/>
+            </a:effectRef>
+            <a:fontRef idx="minor">
+              <a:schemeClr val="lt1"/>
+            </a:fontRef>
+          </p:style>
+          <p:txBody>
+            <a:bodyPr rtlCol="0" anchor="ctr"/>
+            <a:lstStyle/>
+            <a:p>
+              <a:pPr algn="ctr"/>
+              <a:endParaRPr lang="en-US"/>
+            </a:p>
+          </p:txBody>
+        </p:sp>
+      </p:grpSp>
+      <p:sp>
+        <p:nvSpPr>
+          <p:cNvPr id="367" name="Oval 366"/>
+          <p:cNvSpPr/>
+          <p:nvPr/>
+        </p:nvSpPr>
+        <p:spPr>
+          <a:xfrm>
+            <a:off x="2503964" y="1013123"/>
+            <a:ext cx="3209878" cy="3356429"/>
+          </a:xfrm>
+          <a:prstGeom prst="ellipse">
+            <a:avLst/>
+          </a:prstGeom>
+          <a:noFill/>
+          <a:ln>
+            <a:solidFill>
+              <a:schemeClr val="tx1"/>
+            </a:solidFill>
+            <a:prstDash val="dash"/>
+          </a:ln>
+        </p:spPr>
+        <p:style>
+          <a:lnRef idx="1">
+            <a:schemeClr val="accent1"/>
+          </a:lnRef>
+          <a:fillRef idx="3">
+            <a:schemeClr val="accent1"/>
+          </a:fillRef>
+          <a:effectRef idx="2">
+            <a:schemeClr val="accent1"/>
+          </a:effectRef>
+          <a:fontRef idx="minor">
+            <a:schemeClr val="lt1"/>
+          </a:fontRef>
+        </p:style>
+        <p:txBody>
+          <a:bodyPr rtlCol="0" anchor="ctr"/>
+          <a:lstStyle/>
+          <a:p>
+            <a:pPr algn="ctr"/>
+            <a:endParaRPr lang="en-US"/>
+          </a:p>
+        </p:txBody>
+      </p:sp>
+      <p:sp>
+        <p:nvSpPr>
+          <p:cNvPr id="368" name="TextBox 367"/>
+          <p:cNvSpPr txBox="1"/>
+          <p:nvPr/>
+        </p:nvSpPr>
+        <p:spPr>
+          <a:xfrm>
+            <a:off x="1824934" y="-64096"/>
+            <a:ext cx="1815635" cy="1077218"/>
+          </a:xfrm>
+          <a:prstGeom prst="rect">
+            <a:avLst/>
+          </a:prstGeom>
+          <a:noFill/>
+        </p:spPr>
+        <p:txBody>
+          <a:bodyPr wrap="square" rtlCol="0">
+            <a:spAutoFit/>
+          </a:bodyPr>
+          <a:lstStyle/>
+          <a:p>
+            <a:pPr algn="ctr"/>
+            <a:r>
+              <a:rPr lang="en-US" sz="3200" dirty="0" smtClean="0"/>
+              <a:t>Trust</a:t>
+            </a:r>
+          </a:p>
+          <a:p>
+            <a:pPr algn="ctr"/>
+            <a:r>
+              <a:rPr lang="en-US" sz="3200" dirty="0" smtClean="0"/>
+              <a:t>Boundary</a:t>
+            </a:r>
+            <a:endParaRPr lang="en-US" sz="3200" dirty="0"/>
+          </a:p>
+        </p:txBody>
+      </p:sp>
+      <p:sp>
+        <p:nvSpPr>
+          <p:cNvPr id="369" name="TextBox 368"/>
+          <p:cNvSpPr txBox="1"/>
+          <p:nvPr/>
+        </p:nvSpPr>
+        <p:spPr>
+          <a:xfrm>
+            <a:off x="-80376" y="3830941"/>
+            <a:ext cx="2772605" cy="1077218"/>
+          </a:xfrm>
+          <a:prstGeom prst="rect">
+            <a:avLst/>
+          </a:prstGeom>
+          <a:noFill/>
+        </p:spPr>
+        <p:txBody>
+          <a:bodyPr wrap="square" rtlCol="0">
+            <a:spAutoFit/>
+          </a:bodyPr>
+          <a:lstStyle/>
+          <a:p>
+            <a:pPr algn="ctr"/>
+            <a:r>
+              <a:rPr lang="en-US" sz="3200" dirty="0" smtClean="0"/>
+              <a:t>Trusted</a:t>
+            </a:r>
+          </a:p>
+          <a:p>
+            <a:pPr algn="ctr"/>
+            <a:r>
+              <a:rPr lang="en-US" sz="3200" dirty="0" smtClean="0"/>
+              <a:t>N</a:t>
+            </a:r>
+            <a:r>
+              <a:rPr lang="en-US" sz="3200" dirty="0" smtClean="0"/>
+              <a:t>eighborhood</a:t>
+            </a:r>
+            <a:endParaRPr lang="en-US" sz="3200" dirty="0"/>
+          </a:p>
+        </p:txBody>
+      </p:sp>
+      <p:sp>
+        <p:nvSpPr>
+          <p:cNvPr id="370" name="TextBox 369"/>
+          <p:cNvSpPr txBox="1"/>
+          <p:nvPr/>
+        </p:nvSpPr>
+        <p:spPr>
+          <a:xfrm>
+            <a:off x="3166904" y="4611519"/>
+            <a:ext cx="1874061" cy="1077218"/>
+          </a:xfrm>
+          <a:prstGeom prst="rect">
+            <a:avLst/>
+          </a:prstGeom>
+          <a:noFill/>
+        </p:spPr>
+        <p:txBody>
+          <a:bodyPr wrap="square" rtlCol="0">
+            <a:spAutoFit/>
+          </a:bodyPr>
+          <a:lstStyle/>
+          <a:p>
+            <a:pPr algn="ctr"/>
+            <a:r>
+              <a:rPr lang="en-US" sz="3200" dirty="0" smtClean="0"/>
+              <a:t>Untrusted</a:t>
+            </a:r>
+          </a:p>
+          <a:p>
+            <a:pPr algn="ctr"/>
+            <a:r>
+              <a:rPr lang="en-US" sz="3200" dirty="0" smtClean="0"/>
+              <a:t>Region</a:t>
+            </a:r>
+            <a:endParaRPr lang="en-US" sz="3200" dirty="0"/>
+          </a:p>
+        </p:txBody>
+      </p:sp>
+      <p:sp>
+        <p:nvSpPr>
+          <p:cNvPr id="371" name="TextBox 370"/>
+          <p:cNvSpPr txBox="1"/>
+          <p:nvPr/>
+        </p:nvSpPr>
+        <p:spPr>
+          <a:xfrm>
+            <a:off x="132653" y="91972"/>
+            <a:ext cx="988171" cy="584776"/>
+          </a:xfrm>
+          <a:prstGeom prst="rect">
+            <a:avLst/>
+          </a:prstGeom>
+          <a:noFill/>
+        </p:spPr>
+        <p:txBody>
+          <a:bodyPr wrap="none" rtlCol="0">
+            <a:spAutoFit/>
+          </a:bodyPr>
+          <a:lstStyle/>
+          <a:p>
+            <a:r>
+              <a:rPr lang="en-US" sz="3200" dirty="0" smtClean="0"/>
+              <a:t>Alice</a:t>
+            </a:r>
+            <a:endParaRPr lang="en-US" sz="3200" dirty="0"/>
+          </a:p>
+        </p:txBody>
+      </p:sp>
+      <p:sp>
+        <p:nvSpPr>
+          <p:cNvPr id="372" name="Oval 371"/>
+          <p:cNvSpPr/>
+          <p:nvPr/>
+        </p:nvSpPr>
+        <p:spPr>
+          <a:xfrm>
+            <a:off x="3923978" y="1468982"/>
+            <a:ext cx="352055" cy="352095"/>
+          </a:xfrm>
+          <a:prstGeom prst="ellipse">
+            <a:avLst/>
+          </a:prstGeom>
+          <a:solidFill>
+            <a:schemeClr val="accent1">
+              <a:lumMod val="40000"/>
+              <a:lumOff val="60000"/>
+            </a:schemeClr>
+          </a:solidFill>
+          <a:ln>
+            <a:solidFill>
+              <a:schemeClr val="tx1"/>
+            </a:solidFill>
+          </a:ln>
+        </p:spPr>
+        <p:style>
+          <a:lnRef idx="1">
+            <a:schemeClr val="accent1"/>
+          </a:lnRef>
+          <a:fillRef idx="3">
+            <a:schemeClr val="accent1"/>
+          </a:fillRef>
+          <a:effectRef idx="2">
+            <a:schemeClr val="accent1"/>
+          </a:effectRef>
+          <a:fontRef idx="minor">
+            <a:schemeClr val="lt1"/>
+          </a:fontRef>
+        </p:style>
+        <p:txBody>
+          <a:bodyPr rtlCol="0" anchor="ctr"/>
+          <a:lstStyle/>
+          <a:p>
+            <a:pPr algn="ctr"/>
+            <a:endParaRPr lang="en-US">
+              <a:ln>
+                <a:solidFill>
+                  <a:srgbClr val="000000"/>
+                </a:solidFill>
+              </a:ln>
+              <a:solidFill>
+                <a:srgbClr val="000000"/>
+              </a:solidFill>
+            </a:endParaRPr>
+          </a:p>
+        </p:txBody>
+      </p:sp>
+      <p:sp>
+        <p:nvSpPr>
+          <p:cNvPr id="373" name="Oval 372"/>
+          <p:cNvSpPr/>
+          <p:nvPr/>
+        </p:nvSpPr>
+        <p:spPr>
+          <a:xfrm>
+            <a:off x="3923978" y="2173172"/>
+            <a:ext cx="352055" cy="352095"/>
+          </a:xfrm>
+          <a:prstGeom prst="ellipse">
+            <a:avLst/>
+          </a:prstGeom>
+          <a:solidFill>
+            <a:schemeClr val="accent1">
+              <a:lumMod val="40000"/>
+              <a:lumOff val="60000"/>
+            </a:schemeClr>
+          </a:solidFill>
+          <a:ln>
+            <a:solidFill>
+              <a:schemeClr val="tx1"/>
+            </a:solidFill>
+          </a:ln>
+        </p:spPr>
+        <p:style>
+          <a:lnRef idx="1">
+            <a:schemeClr val="accent1"/>
+          </a:lnRef>
+          <a:fillRef idx="3">
+            <a:schemeClr val="accent1"/>
+          </a:fillRef>
+          <a:effectRef idx="2">
+            <a:schemeClr val="accent1"/>
+          </a:effectRef>
+          <a:fontRef idx="minor">
+            <a:schemeClr val="lt1"/>
+          </a:fontRef>
+        </p:style>
+        <p:txBody>
+          <a:bodyPr rtlCol="0" anchor="ctr"/>
+          <a:lstStyle/>
+          <a:p>
+            <a:pPr algn="ctr"/>
+            <a:endParaRPr lang="en-US">
+              <a:ln>
+                <a:solidFill>
+                  <a:srgbClr val="000000"/>
+                </a:solidFill>
+              </a:ln>
+              <a:solidFill>
+                <a:srgbClr val="000000"/>
+              </a:solidFill>
+            </a:endParaRPr>
+          </a:p>
+        </p:txBody>
+      </p:sp>
+      <p:sp>
+        <p:nvSpPr>
+          <p:cNvPr id="374" name="Oval 373"/>
+          <p:cNvSpPr/>
+          <p:nvPr/>
+        </p:nvSpPr>
+        <p:spPr>
+          <a:xfrm>
+            <a:off x="3923978" y="2899871"/>
+            <a:ext cx="352055" cy="352095"/>
+          </a:xfrm>
+          <a:prstGeom prst="ellipse">
+            <a:avLst/>
+          </a:prstGeom>
+          <a:solidFill>
+            <a:schemeClr val="accent1">
+              <a:lumMod val="40000"/>
+              <a:lumOff val="60000"/>
+            </a:schemeClr>
+          </a:solidFill>
+          <a:ln>
+            <a:solidFill>
+              <a:schemeClr val="tx1"/>
+            </a:solidFill>
+          </a:ln>
+        </p:spPr>
+        <p:style>
+          <a:lnRef idx="1">
+            <a:schemeClr val="accent1"/>
+          </a:lnRef>
+          <a:fillRef idx="3">
+            <a:schemeClr val="accent1"/>
+          </a:fillRef>
+          <a:effectRef idx="2">
+            <a:schemeClr val="accent1"/>
+          </a:effectRef>
+          <a:fontRef idx="minor">
+            <a:schemeClr val="lt1"/>
+          </a:fontRef>
+        </p:style>
+        <p:txBody>
+          <a:bodyPr rtlCol="0" anchor="ctr"/>
+          <a:lstStyle/>
+          <a:p>
+            <a:pPr algn="ctr"/>
+            <a:endParaRPr lang="en-US">
+              <a:ln>
+                <a:solidFill>
+                  <a:srgbClr val="000000"/>
+                </a:solidFill>
+              </a:ln>
+              <a:solidFill>
+                <a:srgbClr val="000000"/>
+              </a:solidFill>
+            </a:endParaRPr>
+          </a:p>
+        </p:txBody>
+      </p:sp>
+      <p:sp>
+        <p:nvSpPr>
+          <p:cNvPr id="375" name="Oval 374"/>
+          <p:cNvSpPr/>
+          <p:nvPr/>
+        </p:nvSpPr>
+        <p:spPr>
+          <a:xfrm>
+            <a:off x="3923978" y="3567775"/>
+            <a:ext cx="352055" cy="352095"/>
+          </a:xfrm>
+          <a:prstGeom prst="ellipse">
+            <a:avLst/>
+          </a:prstGeom>
+          <a:solidFill>
+            <a:schemeClr val="accent1">
+              <a:lumMod val="40000"/>
+              <a:lumOff val="60000"/>
+            </a:schemeClr>
+          </a:solidFill>
+          <a:ln>
+            <a:solidFill>
+              <a:schemeClr val="tx1"/>
+            </a:solidFill>
+          </a:ln>
+        </p:spPr>
+        <p:style>
+          <a:lnRef idx="1">
+            <a:schemeClr val="accent1"/>
+          </a:lnRef>
+          <a:fillRef idx="3">
+            <a:schemeClr val="accent1"/>
+          </a:fillRef>
+          <a:effectRef idx="2">
+            <a:schemeClr val="accent1"/>
+          </a:effectRef>
+          <a:fontRef idx="minor">
+            <a:schemeClr val="lt1"/>
+          </a:fontRef>
+        </p:style>
+        <p:txBody>
+          <a:bodyPr rtlCol="0" anchor="ctr"/>
+          <a:lstStyle/>
+          <a:p>
+            <a:pPr algn="ctr"/>
+            <a:endParaRPr lang="en-US">
+              <a:ln>
+                <a:solidFill>
+                  <a:srgbClr val="000000"/>
+                </a:solidFill>
+              </a:ln>
+              <a:solidFill>
+                <a:srgbClr val="000000"/>
+              </a:solidFill>
+            </a:endParaRPr>
+          </a:p>
+        </p:txBody>
+      </p:sp>
+      <p:grpSp>
+        <p:nvGrpSpPr>
+          <p:cNvPr id="376" name="Group 375"/>
+          <p:cNvGrpSpPr/>
+          <p:nvPr/>
+        </p:nvGrpSpPr>
+        <p:grpSpPr>
+          <a:xfrm>
+            <a:off x="4681304" y="1691672"/>
+            <a:ext cx="839877" cy="2036978"/>
+            <a:chOff x="3328123" y="2281023"/>
+            <a:chExt cx="839877" cy="2036978"/>
+          </a:xfrm>
+        </p:grpSpPr>
+        <p:sp>
+          <p:nvSpPr>
+            <p:cNvPr id="377" name="Oval 376"/>
+            <p:cNvSpPr/>
+            <p:nvPr/>
+          </p:nvSpPr>
+          <p:spPr>
+            <a:xfrm>
+              <a:off x="3567346" y="2422668"/>
               <a:ext cx="352055" cy="352095"/>
             </a:xfrm>
             <a:prstGeom prst="ellipse">
@@ -3729,753 +4795,22 @@
             </a:p>
           </p:txBody>
         </p:sp>
-      </p:grpSp>
-      <p:cxnSp>
-        <p:nvCxnSpPr>
-          <p:cNvPr id="29" name="Straight Connector 28"/>
-          <p:cNvCxnSpPr>
-            <a:stCxn id="43" idx="2"/>
-            <a:endCxn id="7" idx="7"/>
-          </p:cNvCxnSpPr>
-          <p:nvPr/>
-        </p:nvCxnSpPr>
-        <p:spPr>
-          <a:xfrm flipH="1">
-            <a:off x="2414348" y="2407331"/>
-            <a:ext cx="318637" cy="209499"/>
-          </a:xfrm>
-          <a:prstGeom prst="line">
-            <a:avLst/>
-          </a:prstGeom>
-          <a:ln>
-            <a:solidFill>
-              <a:srgbClr val="000000"/>
-            </a:solidFill>
-          </a:ln>
-        </p:spPr>
-        <p:style>
-          <a:lnRef idx="2">
-            <a:schemeClr val="accent1"/>
-          </a:lnRef>
-          <a:fillRef idx="0">
-            <a:schemeClr val="accent1"/>
-          </a:fillRef>
-          <a:effectRef idx="1">
-            <a:schemeClr val="accent1"/>
-          </a:effectRef>
-          <a:fontRef idx="minor">
-            <a:schemeClr val="tx1"/>
-          </a:fontRef>
-        </p:style>
-      </p:cxnSp>
-      <p:cxnSp>
-        <p:nvCxnSpPr>
-          <p:cNvPr id="32" name="Straight Connector 31"/>
-          <p:cNvCxnSpPr>
-            <a:stCxn id="11" idx="7"/>
-            <a:endCxn id="14" idx="2"/>
-          </p:cNvCxnSpPr>
-          <p:nvPr/>
-        </p:nvCxnSpPr>
-        <p:spPr>
-          <a:xfrm flipV="1">
-            <a:off x="2590375" y="3126858"/>
-            <a:ext cx="1387642" cy="93562"/>
-          </a:xfrm>
-          <a:prstGeom prst="line">
-            <a:avLst/>
-          </a:prstGeom>
-          <a:ln>
-            <a:solidFill>
-              <a:srgbClr val="000000"/>
-            </a:solidFill>
-          </a:ln>
-        </p:spPr>
-        <p:style>
-          <a:lnRef idx="2">
-            <a:schemeClr val="accent1"/>
-          </a:lnRef>
-          <a:fillRef idx="0">
-            <a:schemeClr val="accent1"/>
-          </a:fillRef>
-          <a:effectRef idx="1">
-            <a:schemeClr val="accent1"/>
-          </a:effectRef>
-          <a:fontRef idx="minor">
-            <a:schemeClr val="tx1"/>
-          </a:fontRef>
-        </p:style>
-      </p:cxnSp>
-      <p:cxnSp>
-        <p:nvCxnSpPr>
-          <p:cNvPr id="33" name="Straight Connector 32"/>
-          <p:cNvCxnSpPr>
-            <a:stCxn id="27" idx="2"/>
-            <a:endCxn id="11" idx="6"/>
-          </p:cNvCxnSpPr>
-          <p:nvPr/>
-        </p:nvCxnSpPr>
-        <p:spPr>
-          <a:xfrm flipH="1" flipV="1">
-            <a:off x="2641932" y="3344905"/>
-            <a:ext cx="1336085" cy="437582"/>
-          </a:xfrm>
-          <a:prstGeom prst="line">
-            <a:avLst/>
-          </a:prstGeom>
-          <a:ln>
-            <a:solidFill>
-              <a:srgbClr val="000000"/>
-            </a:solidFill>
-          </a:ln>
-        </p:spPr>
-        <p:style>
-          <a:lnRef idx="2">
-            <a:schemeClr val="accent1"/>
-          </a:lnRef>
-          <a:fillRef idx="0">
-            <a:schemeClr val="accent1"/>
-          </a:fillRef>
-          <a:effectRef idx="1">
-            <a:schemeClr val="accent1"/>
-          </a:effectRef>
-          <a:fontRef idx="minor">
-            <a:schemeClr val="tx1"/>
-          </a:fontRef>
-        </p:style>
-      </p:cxnSp>
-      <p:cxnSp>
-        <p:nvCxnSpPr>
-          <p:cNvPr id="34" name="Straight Connector 33"/>
-          <p:cNvCxnSpPr>
-            <a:stCxn id="15" idx="2"/>
-          </p:cNvCxnSpPr>
-          <p:nvPr/>
-        </p:nvCxnSpPr>
-        <p:spPr>
-          <a:xfrm flipH="1" flipV="1">
-            <a:off x="2885386" y="4100898"/>
-            <a:ext cx="1092631" cy="233384"/>
-          </a:xfrm>
-          <a:prstGeom prst="line">
-            <a:avLst/>
-          </a:prstGeom>
-          <a:ln>
-            <a:solidFill>
-              <a:srgbClr val="000000"/>
-            </a:solidFill>
-          </a:ln>
-        </p:spPr>
-        <p:style>
-          <a:lnRef idx="2">
-            <a:schemeClr val="accent1"/>
-          </a:lnRef>
-          <a:fillRef idx="0">
-            <a:schemeClr val="accent1"/>
-          </a:fillRef>
-          <a:effectRef idx="1">
-            <a:schemeClr val="accent1"/>
-          </a:effectRef>
-          <a:fontRef idx="minor">
-            <a:schemeClr val="tx1"/>
-          </a:fontRef>
-        </p:style>
-      </p:cxnSp>
-      <p:cxnSp>
-        <p:nvCxnSpPr>
-          <p:cNvPr id="42" name="Straight Connector 41"/>
-          <p:cNvCxnSpPr>
-            <a:stCxn id="27" idx="0"/>
-            <a:endCxn id="14" idx="4"/>
-          </p:cNvCxnSpPr>
-          <p:nvPr/>
-        </p:nvCxnSpPr>
-        <p:spPr>
-          <a:xfrm flipV="1">
-            <a:off x="4154045" y="3302905"/>
-            <a:ext cx="0" cy="303534"/>
-          </a:xfrm>
-          <a:prstGeom prst="line">
-            <a:avLst/>
-          </a:prstGeom>
-          <a:ln>
-            <a:solidFill>
-              <a:srgbClr val="000000"/>
-            </a:solidFill>
-          </a:ln>
-        </p:spPr>
-        <p:style>
-          <a:lnRef idx="2">
-            <a:schemeClr val="accent1"/>
-          </a:lnRef>
-          <a:fillRef idx="0">
-            <a:schemeClr val="accent1"/>
-          </a:fillRef>
-          <a:effectRef idx="1">
-            <a:schemeClr val="accent1"/>
-          </a:effectRef>
-          <a:fontRef idx="minor">
-            <a:schemeClr val="tx1"/>
-          </a:fontRef>
-        </p:style>
-      </p:cxnSp>
-      <p:cxnSp>
-        <p:nvCxnSpPr>
-          <p:cNvPr id="45" name="Straight Connector 44"/>
-          <p:cNvCxnSpPr>
-            <a:stCxn id="13" idx="2"/>
-            <a:endCxn id="14" idx="6"/>
-          </p:cNvCxnSpPr>
-          <p:nvPr/>
-        </p:nvCxnSpPr>
-        <p:spPr>
-          <a:xfrm flipH="1" flipV="1">
-            <a:off x="4330072" y="3126858"/>
-            <a:ext cx="709501" cy="397096"/>
-          </a:xfrm>
-          <a:prstGeom prst="line">
-            <a:avLst/>
-          </a:prstGeom>
-          <a:ln>
-            <a:solidFill>
-              <a:srgbClr val="000000"/>
-            </a:solidFill>
-          </a:ln>
-        </p:spPr>
-        <p:style>
-          <a:lnRef idx="2">
-            <a:schemeClr val="accent1"/>
-          </a:lnRef>
-          <a:fillRef idx="0">
-            <a:schemeClr val="accent1"/>
-          </a:fillRef>
-          <a:effectRef idx="1">
-            <a:schemeClr val="accent1"/>
-          </a:effectRef>
-          <a:fontRef idx="minor">
-            <a:schemeClr val="tx1"/>
-          </a:fontRef>
-        </p:style>
-      </p:cxnSp>
-      <p:cxnSp>
-        <p:nvCxnSpPr>
-          <p:cNvPr id="49" name="Straight Connector 48"/>
-          <p:cNvCxnSpPr>
-            <a:stCxn id="9" idx="2"/>
-            <a:endCxn id="10" idx="6"/>
-          </p:cNvCxnSpPr>
-          <p:nvPr/>
-        </p:nvCxnSpPr>
-        <p:spPr>
-          <a:xfrm flipH="1" flipV="1">
-            <a:off x="4330072" y="2383681"/>
-            <a:ext cx="885528" cy="342532"/>
-          </a:xfrm>
-          <a:prstGeom prst="line">
-            <a:avLst/>
-          </a:prstGeom>
-          <a:ln>
-            <a:solidFill>
-              <a:srgbClr val="000000"/>
-            </a:solidFill>
-          </a:ln>
-        </p:spPr>
-        <p:style>
-          <a:lnRef idx="2">
-            <a:schemeClr val="accent1"/>
-          </a:lnRef>
-          <a:fillRef idx="0">
-            <a:schemeClr val="accent1"/>
-          </a:fillRef>
-          <a:effectRef idx="1">
-            <a:schemeClr val="accent1"/>
-          </a:effectRef>
-          <a:fontRef idx="minor">
-            <a:schemeClr val="tx1"/>
-          </a:fontRef>
-        </p:style>
-      </p:cxnSp>
-      <p:cxnSp>
-        <p:nvCxnSpPr>
-          <p:cNvPr id="52" name="Straight Connector 51"/>
-          <p:cNvCxnSpPr>
-            <a:stCxn id="13" idx="0"/>
-            <a:endCxn id="9" idx="4"/>
-          </p:cNvCxnSpPr>
-          <p:nvPr/>
-        </p:nvCxnSpPr>
-        <p:spPr>
-          <a:xfrm flipV="1">
-            <a:off x="5215601" y="2902260"/>
-            <a:ext cx="176027" cy="445646"/>
-          </a:xfrm>
-          <a:prstGeom prst="line">
-            <a:avLst/>
-          </a:prstGeom>
-          <a:ln>
-            <a:solidFill>
-              <a:srgbClr val="000000"/>
-            </a:solidFill>
-          </a:ln>
-        </p:spPr>
-        <p:style>
-          <a:lnRef idx="2">
-            <a:schemeClr val="accent1"/>
-          </a:lnRef>
-          <a:fillRef idx="0">
-            <a:schemeClr val="accent1"/>
-          </a:fillRef>
-          <a:effectRef idx="1">
-            <a:schemeClr val="accent1"/>
-          </a:effectRef>
-          <a:fontRef idx="minor">
-            <a:schemeClr val="tx1"/>
-          </a:fontRef>
-        </p:style>
-      </p:cxnSp>
-      <p:cxnSp>
-        <p:nvCxnSpPr>
-          <p:cNvPr id="55" name="Straight Connector 54"/>
-          <p:cNvCxnSpPr>
-            <a:stCxn id="13" idx="6"/>
-            <a:endCxn id="12" idx="3"/>
-          </p:cNvCxnSpPr>
-          <p:nvPr/>
-        </p:nvCxnSpPr>
-        <p:spPr>
-          <a:xfrm flipV="1">
-            <a:off x="5391628" y="3358981"/>
-            <a:ext cx="587237" cy="164973"/>
-          </a:xfrm>
-          <a:prstGeom prst="line">
-            <a:avLst/>
-          </a:prstGeom>
-          <a:ln>
-            <a:solidFill>
-              <a:srgbClr val="000000"/>
-            </a:solidFill>
-          </a:ln>
-        </p:spPr>
-        <p:style>
-          <a:lnRef idx="2">
-            <a:schemeClr val="accent1"/>
-          </a:lnRef>
-          <a:fillRef idx="0">
-            <a:schemeClr val="accent1"/>
-          </a:fillRef>
-          <a:effectRef idx="1">
-            <a:schemeClr val="accent1"/>
-          </a:effectRef>
-          <a:fontRef idx="minor">
-            <a:schemeClr val="tx1"/>
-          </a:fontRef>
-        </p:style>
-      </p:cxnSp>
-      <p:cxnSp>
-        <p:nvCxnSpPr>
-          <p:cNvPr id="58" name="Straight Connector 57"/>
-          <p:cNvCxnSpPr>
-            <a:stCxn id="12" idx="4"/>
-            <a:endCxn id="16" idx="7"/>
-          </p:cNvCxnSpPr>
-          <p:nvPr/>
-        </p:nvCxnSpPr>
-        <p:spPr>
-          <a:xfrm flipH="1">
-            <a:off x="5588080" y="3410544"/>
-            <a:ext cx="515256" cy="565869"/>
-          </a:xfrm>
-          <a:prstGeom prst="line">
-            <a:avLst/>
-          </a:prstGeom>
-          <a:ln>
-            <a:solidFill>
-              <a:srgbClr val="000000"/>
-            </a:solidFill>
-          </a:ln>
-        </p:spPr>
-        <p:style>
-          <a:lnRef idx="2">
-            <a:schemeClr val="accent1"/>
-          </a:lnRef>
-          <a:fillRef idx="0">
-            <a:schemeClr val="accent1"/>
-          </a:fillRef>
-          <a:effectRef idx="1">
-            <a:schemeClr val="accent1"/>
-          </a:effectRef>
-          <a:fontRef idx="minor">
-            <a:schemeClr val="tx1"/>
-          </a:fontRef>
-        </p:style>
-      </p:cxnSp>
-      <p:sp>
-        <p:nvSpPr>
-          <p:cNvPr id="61" name="Oval 60"/>
-          <p:cNvSpPr/>
-          <p:nvPr/>
-        </p:nvSpPr>
-        <p:spPr>
-          <a:xfrm>
-            <a:off x="3708794" y="1714839"/>
-            <a:ext cx="835020" cy="3246682"/>
-          </a:xfrm>
-          <a:prstGeom prst="ellipse">
-            <a:avLst/>
-          </a:prstGeom>
-          <a:noFill/>
-          <a:ln>
-            <a:solidFill>
-              <a:schemeClr val="tx1"/>
-            </a:solidFill>
-            <a:prstDash val="dash"/>
-          </a:ln>
-        </p:spPr>
-        <p:style>
-          <a:lnRef idx="1">
-            <a:schemeClr val="accent1"/>
-          </a:lnRef>
-          <a:fillRef idx="3">
-            <a:schemeClr val="accent1"/>
-          </a:fillRef>
-          <a:effectRef idx="2">
-            <a:schemeClr val="accent1"/>
-          </a:effectRef>
-          <a:fontRef idx="minor">
-            <a:schemeClr val="lt1"/>
-          </a:fontRef>
-        </p:style>
-        <p:txBody>
-          <a:bodyPr rtlCol="0" anchor="ctr"/>
-          <a:lstStyle/>
-          <a:p>
-            <a:pPr algn="ctr"/>
-            <a:endParaRPr lang="en-US"/>
-          </a:p>
-        </p:txBody>
-      </p:sp>
-      <p:sp>
-        <p:nvSpPr>
-          <p:cNvPr id="62" name="Oval 61"/>
-          <p:cNvSpPr/>
-          <p:nvPr/>
-        </p:nvSpPr>
-        <p:spPr>
-          <a:xfrm>
-            <a:off x="4889170" y="1714839"/>
-            <a:ext cx="1921868" cy="3246681"/>
-          </a:xfrm>
-          <a:prstGeom prst="ellipse">
-            <a:avLst/>
-          </a:prstGeom>
-          <a:noFill/>
-          <a:ln>
-            <a:solidFill>
-              <a:schemeClr val="tx1"/>
-            </a:solidFill>
-            <a:prstDash val="dash"/>
-          </a:ln>
-        </p:spPr>
-        <p:style>
-          <a:lnRef idx="1">
-            <a:schemeClr val="accent1"/>
-          </a:lnRef>
-          <a:fillRef idx="3">
-            <a:schemeClr val="accent1"/>
-          </a:fillRef>
-          <a:effectRef idx="2">
-            <a:schemeClr val="accent1"/>
-          </a:effectRef>
-          <a:fontRef idx="minor">
-            <a:schemeClr val="lt1"/>
-          </a:fontRef>
-        </p:style>
-        <p:txBody>
-          <a:bodyPr rtlCol="0" anchor="ctr"/>
-          <a:lstStyle/>
-          <a:p>
-            <a:pPr algn="ctr"/>
-            <a:endParaRPr lang="en-US"/>
-          </a:p>
-        </p:txBody>
-      </p:sp>
-      <p:grpSp>
-        <p:nvGrpSpPr>
-          <p:cNvPr id="71" name="Group 70"/>
-          <p:cNvGrpSpPr/>
-          <p:nvPr/>
-        </p:nvGrpSpPr>
-        <p:grpSpPr>
-          <a:xfrm>
-            <a:off x="5039573" y="2389220"/>
-            <a:ext cx="1591845" cy="1887725"/>
-            <a:chOff x="4406004" y="2389220"/>
-            <a:chExt cx="1591845" cy="1887725"/>
-          </a:xfrm>
-        </p:grpSpPr>
-        <p:grpSp>
-          <p:nvGrpSpPr>
-            <p:cNvPr id="48" name="Group 47"/>
-            <p:cNvGrpSpPr/>
-            <p:nvPr/>
-          </p:nvGrpSpPr>
-          <p:grpSpPr>
-            <a:xfrm>
-              <a:off x="4406004" y="2550165"/>
-              <a:ext cx="1239790" cy="1726780"/>
-              <a:chOff x="4849872" y="2550165"/>
-              <a:chExt cx="1239790" cy="1726780"/>
-            </a:xfrm>
-          </p:grpSpPr>
-          <p:sp>
-            <p:nvSpPr>
-              <p:cNvPr id="9" name="Oval 8"/>
-              <p:cNvSpPr/>
-              <p:nvPr/>
-            </p:nvSpPr>
-            <p:spPr>
-              <a:xfrm>
-                <a:off x="5025899" y="2550165"/>
-                <a:ext cx="352055" cy="352095"/>
-              </a:xfrm>
-              <a:prstGeom prst="ellipse">
-                <a:avLst/>
-              </a:prstGeom>
-              <a:solidFill>
-                <a:schemeClr val="accent4">
-                  <a:lumMod val="40000"/>
-                  <a:lumOff val="60000"/>
-                </a:schemeClr>
-              </a:solidFill>
-              <a:ln>
-                <a:solidFill>
-                  <a:schemeClr val="tx1"/>
-                </a:solidFill>
-              </a:ln>
-            </p:spPr>
-            <p:style>
-              <a:lnRef idx="1">
-                <a:schemeClr val="accent1"/>
-              </a:lnRef>
-              <a:fillRef idx="3">
-                <a:schemeClr val="accent1"/>
-              </a:fillRef>
-              <a:effectRef idx="2">
-                <a:schemeClr val="accent1"/>
-              </a:effectRef>
-              <a:fontRef idx="minor">
-                <a:schemeClr val="lt1"/>
-              </a:fontRef>
-            </p:style>
-            <p:txBody>
-              <a:bodyPr rtlCol="0" anchor="ctr"/>
-              <a:lstStyle/>
-              <a:p>
-                <a:pPr algn="ctr"/>
-                <a:endParaRPr lang="en-US">
-                  <a:ln>
-                    <a:solidFill>
-                      <a:srgbClr val="000000"/>
-                    </a:solidFill>
-                  </a:ln>
-                  <a:solidFill>
-                    <a:srgbClr val="000000"/>
-                  </a:solidFill>
-                </a:endParaRPr>
-              </a:p>
-            </p:txBody>
-          </p:sp>
-          <p:sp>
-            <p:nvSpPr>
-              <p:cNvPr id="12" name="Oval 11"/>
-              <p:cNvSpPr/>
-              <p:nvPr/>
-            </p:nvSpPr>
-            <p:spPr>
-              <a:xfrm>
-                <a:off x="5737607" y="3058449"/>
-                <a:ext cx="352055" cy="352095"/>
-              </a:xfrm>
-              <a:prstGeom prst="ellipse">
-                <a:avLst/>
-              </a:prstGeom>
-              <a:solidFill>
-                <a:schemeClr val="accent4">
-                  <a:lumMod val="40000"/>
-                  <a:lumOff val="60000"/>
-                </a:schemeClr>
-              </a:solidFill>
-              <a:ln>
-                <a:solidFill>
-                  <a:schemeClr val="tx1"/>
-                </a:solidFill>
-              </a:ln>
-            </p:spPr>
-            <p:style>
-              <a:lnRef idx="1">
-                <a:schemeClr val="accent1"/>
-              </a:lnRef>
-              <a:fillRef idx="3">
-                <a:schemeClr val="accent1"/>
-              </a:fillRef>
-              <a:effectRef idx="2">
-                <a:schemeClr val="accent1"/>
-              </a:effectRef>
-              <a:fontRef idx="minor">
-                <a:schemeClr val="lt1"/>
-              </a:fontRef>
-            </p:style>
-            <p:txBody>
-              <a:bodyPr rtlCol="0" anchor="ctr"/>
-              <a:lstStyle/>
-              <a:p>
-                <a:pPr algn="ctr"/>
-                <a:endParaRPr lang="en-US">
-                  <a:ln>
-                    <a:solidFill>
-                      <a:srgbClr val="000000"/>
-                    </a:solidFill>
-                  </a:ln>
-                  <a:solidFill>
-                    <a:srgbClr val="000000"/>
-                  </a:solidFill>
-                </a:endParaRPr>
-              </a:p>
-            </p:txBody>
-          </p:sp>
-          <p:sp>
-            <p:nvSpPr>
-              <p:cNvPr id="13" name="Oval 12"/>
-              <p:cNvSpPr/>
-              <p:nvPr/>
-            </p:nvSpPr>
-            <p:spPr>
-              <a:xfrm>
-                <a:off x="4849872" y="3347906"/>
-                <a:ext cx="352055" cy="352095"/>
-              </a:xfrm>
-              <a:prstGeom prst="ellipse">
-                <a:avLst/>
-              </a:prstGeom>
-              <a:solidFill>
-                <a:schemeClr val="accent4">
-                  <a:lumMod val="40000"/>
-                  <a:lumOff val="60000"/>
-                </a:schemeClr>
-              </a:solidFill>
-              <a:ln>
-                <a:solidFill>
-                  <a:schemeClr val="tx1"/>
-                </a:solidFill>
-              </a:ln>
-            </p:spPr>
-            <p:style>
-              <a:lnRef idx="1">
-                <a:schemeClr val="accent1"/>
-              </a:lnRef>
-              <a:fillRef idx="3">
-                <a:schemeClr val="accent1"/>
-              </a:fillRef>
-              <a:effectRef idx="2">
-                <a:schemeClr val="accent1"/>
-              </a:effectRef>
-              <a:fontRef idx="minor">
-                <a:schemeClr val="lt1"/>
-              </a:fontRef>
-            </p:style>
-            <p:txBody>
-              <a:bodyPr rtlCol="0" anchor="ctr"/>
-              <a:lstStyle/>
-              <a:p>
-                <a:pPr algn="ctr"/>
-                <a:endParaRPr lang="en-US">
-                  <a:ln>
-                    <a:solidFill>
-                      <a:srgbClr val="000000"/>
-                    </a:solidFill>
-                  </a:ln>
-                  <a:solidFill>
-                    <a:srgbClr val="000000"/>
-                  </a:solidFill>
-                </a:endParaRPr>
-              </a:p>
-            </p:txBody>
-          </p:sp>
-          <p:sp>
-            <p:nvSpPr>
-              <p:cNvPr id="16" name="Oval 15"/>
-              <p:cNvSpPr/>
-              <p:nvPr/>
-            </p:nvSpPr>
-            <p:spPr>
-              <a:xfrm>
-                <a:off x="5097881" y="3924850"/>
-                <a:ext cx="352055" cy="352095"/>
-              </a:xfrm>
-              <a:prstGeom prst="ellipse">
-                <a:avLst/>
-              </a:prstGeom>
-              <a:solidFill>
-                <a:schemeClr val="accent4">
-                  <a:lumMod val="40000"/>
-                  <a:lumOff val="60000"/>
-                </a:schemeClr>
-              </a:solidFill>
-              <a:ln>
-                <a:solidFill>
-                  <a:schemeClr val="tx1"/>
-                </a:solidFill>
-              </a:ln>
-            </p:spPr>
-            <p:style>
-              <a:lnRef idx="1">
-                <a:schemeClr val="accent1"/>
-              </a:lnRef>
-              <a:fillRef idx="3">
-                <a:schemeClr val="accent1"/>
-              </a:fillRef>
-              <a:effectRef idx="2">
-                <a:schemeClr val="accent1"/>
-              </a:effectRef>
-              <a:fontRef idx="minor">
-                <a:schemeClr val="lt1"/>
-              </a:fontRef>
-            </p:style>
-            <p:txBody>
-              <a:bodyPr rtlCol="0" anchor="ctr"/>
-              <a:lstStyle/>
-              <a:p>
-                <a:pPr algn="ctr"/>
-                <a:endParaRPr lang="en-US">
-                  <a:ln>
-                    <a:solidFill>
-                      <a:srgbClr val="000000"/>
-                    </a:solidFill>
-                  </a:ln>
-                  <a:solidFill>
-                    <a:srgbClr val="000000"/>
-                  </a:solidFill>
-                </a:endParaRPr>
-              </a:p>
-            </p:txBody>
-          </p:sp>
-        </p:grpSp>
         <p:sp>
           <p:nvSpPr>
-            <p:cNvPr id="63" name="Oval 62"/>
+            <p:cNvPr id="378" name="Oval 377"/>
             <p:cNvSpPr/>
             <p:nvPr/>
           </p:nvSpPr>
           <p:spPr>
             <a:xfrm>
-              <a:off x="5645794" y="3547606"/>
+              <a:off x="3567346" y="3825746"/>
               <a:ext cx="352055" cy="352095"/>
             </a:xfrm>
             <a:prstGeom prst="ellipse">
               <a:avLst/>
             </a:prstGeom>
             <a:solidFill>
-              <a:schemeClr val="accent4">
+              <a:schemeClr val="accent1">
                 <a:lumMod val="40000"/>
                 <a:lumOff val="60000"/>
               </a:schemeClr>
@@ -4520,20 +4855,20 @@
         </p:sp>
         <p:sp>
           <p:nvSpPr>
-            <p:cNvPr id="64" name="Oval 63"/>
+            <p:cNvPr id="379" name="Oval 378"/>
             <p:cNvSpPr/>
             <p:nvPr/>
           </p:nvSpPr>
           <p:spPr>
             <a:xfrm>
-              <a:off x="5622166" y="2389220"/>
+              <a:off x="3567346" y="3121556"/>
               <a:ext cx="352055" cy="352095"/>
             </a:xfrm>
             <a:prstGeom prst="ellipse">
               <a:avLst/>
             </a:prstGeom>
             <a:solidFill>
-              <a:schemeClr val="accent4">
+              <a:schemeClr val="accent1">
                 <a:lumMod val="40000"/>
                 <a:lumOff val="60000"/>
               </a:schemeClr>
@@ -4576,212 +4911,164 @@
             </a:p>
           </p:txBody>
         </p:sp>
+        <p:sp>
+          <p:nvSpPr>
+            <p:cNvPr id="380" name="Oval 379"/>
+            <p:cNvSpPr/>
+            <p:nvPr/>
+          </p:nvSpPr>
+          <p:spPr>
+            <a:xfrm>
+              <a:off x="3328123" y="2281023"/>
+              <a:ext cx="839877" cy="2036978"/>
+            </a:xfrm>
+            <a:prstGeom prst="ellipse">
+              <a:avLst/>
+            </a:prstGeom>
+            <a:noFill/>
+            <a:ln>
+              <a:solidFill>
+                <a:schemeClr val="tx1"/>
+              </a:solidFill>
+              <a:prstDash val="dash"/>
+            </a:ln>
+          </p:spPr>
+          <p:style>
+            <a:lnRef idx="1">
+              <a:schemeClr val="accent1"/>
+            </a:lnRef>
+            <a:fillRef idx="3">
+              <a:schemeClr val="accent1"/>
+            </a:fillRef>
+            <a:effectRef idx="2">
+              <a:schemeClr val="accent1"/>
+            </a:effectRef>
+            <a:fontRef idx="minor">
+              <a:schemeClr val="lt1"/>
+            </a:fontRef>
+          </p:style>
+          <p:txBody>
+            <a:bodyPr rtlCol="0" anchor="ctr"/>
+            <a:lstStyle/>
+            <a:p>
+              <a:pPr algn="ctr"/>
+              <a:endParaRPr lang="en-US"/>
+            </a:p>
+          </p:txBody>
+        </p:sp>
       </p:grpSp>
-      <p:cxnSp>
-        <p:nvCxnSpPr>
-          <p:cNvPr id="65" name="Straight Connector 64"/>
-          <p:cNvCxnSpPr>
-            <a:stCxn id="64" idx="2"/>
-            <a:endCxn id="9" idx="6"/>
-          </p:cNvCxnSpPr>
+      <p:sp>
+        <p:nvSpPr>
+          <p:cNvPr id="381" name="Oval 380"/>
+          <p:cNvSpPr/>
           <p:nvPr/>
-        </p:nvCxnSpPr>
-        <p:spPr>
-          <a:xfrm flipH="1">
-            <a:off x="5567655" y="2565268"/>
-            <a:ext cx="688080" cy="160945"/>
-          </a:xfrm>
-          <a:prstGeom prst="line">
+        </p:nvSpPr>
+        <p:spPr>
+          <a:xfrm>
+            <a:off x="7076114" y="2537507"/>
+            <a:ext cx="352055" cy="352095"/>
+          </a:xfrm>
+          <a:prstGeom prst="ellipse">
             <a:avLst/>
           </a:prstGeom>
+          <a:solidFill>
+            <a:schemeClr val="accent2">
+              <a:lumMod val="40000"/>
+              <a:lumOff val="60000"/>
+            </a:schemeClr>
+          </a:solidFill>
           <a:ln>
             <a:solidFill>
-              <a:srgbClr val="000000"/>
+              <a:schemeClr val="tx1"/>
             </a:solidFill>
           </a:ln>
         </p:spPr>
         <p:style>
-          <a:lnRef idx="2">
+          <a:lnRef idx="1">
             <a:schemeClr val="accent1"/>
           </a:lnRef>
-          <a:fillRef idx="0">
+          <a:fillRef idx="3">
             <a:schemeClr val="accent1"/>
           </a:fillRef>
-          <a:effectRef idx="1">
+          <a:effectRef idx="2">
             <a:schemeClr val="accent1"/>
           </a:effectRef>
           <a:fontRef idx="minor">
-            <a:schemeClr val="tx1"/>
+            <a:schemeClr val="lt1"/>
           </a:fontRef>
         </p:style>
-      </p:cxnSp>
-      <p:cxnSp>
-        <p:nvCxnSpPr>
-          <p:cNvPr id="68" name="Straight Connector 67"/>
-          <p:cNvCxnSpPr>
-            <a:stCxn id="63" idx="3"/>
-            <a:endCxn id="16" idx="6"/>
-          </p:cNvCxnSpPr>
+        <p:txBody>
+          <a:bodyPr rtlCol="0" anchor="ctr"/>
+          <a:lstStyle/>
+          <a:p>
+            <a:pPr algn="ctr"/>
+            <a:endParaRPr lang="en-US">
+              <a:ln>
+                <a:solidFill>
+                  <a:srgbClr val="000000"/>
+                </a:solidFill>
+              </a:ln>
+              <a:solidFill>
+                <a:srgbClr val="000000"/>
+              </a:solidFill>
+            </a:endParaRPr>
+          </a:p>
+        </p:txBody>
+      </p:sp>
+      <p:sp>
+        <p:nvSpPr>
+          <p:cNvPr id="382" name="Oval 381"/>
+          <p:cNvSpPr/>
           <p:nvPr/>
-        </p:nvCxnSpPr>
-        <p:spPr>
-          <a:xfrm flipH="1">
-            <a:off x="5639637" y="3848138"/>
-            <a:ext cx="691283" cy="252760"/>
-          </a:xfrm>
-          <a:prstGeom prst="line">
-            <a:avLst/>
-          </a:prstGeom>
-          <a:ln>
-            <a:solidFill>
-              <a:srgbClr val="000000"/>
-            </a:solidFill>
-          </a:ln>
-        </p:spPr>
-        <p:style>
-          <a:lnRef idx="2">
-            <a:schemeClr val="accent1"/>
-          </a:lnRef>
-          <a:fillRef idx="0">
-            <a:schemeClr val="accent1"/>
-          </a:fillRef>
-          <a:effectRef idx="1">
-            <a:schemeClr val="accent1"/>
-          </a:effectRef>
-          <a:fontRef idx="minor">
-            <a:schemeClr val="tx1"/>
-          </a:fontRef>
-        </p:style>
-      </p:cxnSp>
-      <p:sp>
-        <p:nvSpPr>
-          <p:cNvPr id="72" name="TextBox 71"/>
-          <p:cNvSpPr txBox="1"/>
-          <p:nvPr/>
         </p:nvSpPr>
         <p:spPr>
           <a:xfrm>
-            <a:off x="2470221" y="5178717"/>
-            <a:ext cx="3518712" cy="584776"/>
-          </a:xfrm>
-          <a:prstGeom prst="rect">
+            <a:off x="6050835" y="1833317"/>
+            <a:ext cx="1704311" cy="1755173"/>
+          </a:xfrm>
+          <a:prstGeom prst="ellipse">
             <a:avLst/>
           </a:prstGeom>
           <a:noFill/>
-        </p:spPr>
-        <p:txBody>
-          <a:bodyPr wrap="none" rtlCol="0">
-            <a:spAutoFit/>
-          </a:bodyPr>
-          <a:lstStyle/>
-          <a:p>
-            <a:r>
-              <a:rPr lang="en-US" sz="3200" dirty="0" smtClean="0"/>
-              <a:t>Trust boundary B(h)</a:t>
-            </a:r>
-            <a:endParaRPr lang="en-US" sz="3200" dirty="0"/>
-          </a:p>
-        </p:txBody>
-      </p:sp>
-      <p:sp>
-        <p:nvSpPr>
-          <p:cNvPr id="73" name="TextBox 72"/>
-          <p:cNvSpPr txBox="1"/>
-          <p:nvPr/>
-        </p:nvSpPr>
-        <p:spPr>
-          <a:xfrm>
-            <a:off x="1133847" y="441874"/>
-            <a:ext cx="2664116" cy="1077218"/>
-          </a:xfrm>
-          <a:prstGeom prst="rect">
-            <a:avLst/>
-          </a:prstGeom>
-          <a:noFill/>
-        </p:spPr>
-        <p:txBody>
-          <a:bodyPr wrap="square" rtlCol="0">
-            <a:spAutoFit/>
-          </a:bodyPr>
-          <a:lstStyle/>
-          <a:p>
-            <a:r>
-              <a:rPr lang="en-US" sz="3200" dirty="0" smtClean="0"/>
-              <a:t>Trusted Neighborhood</a:t>
-            </a:r>
-            <a:endParaRPr lang="en-US" sz="3200" dirty="0"/>
-          </a:p>
-        </p:txBody>
-      </p:sp>
-      <p:sp>
-        <p:nvSpPr>
-          <p:cNvPr id="74" name="TextBox 73"/>
-          <p:cNvSpPr txBox="1"/>
-          <p:nvPr/>
-        </p:nvSpPr>
-        <p:spPr>
-          <a:xfrm>
-            <a:off x="4735954" y="441874"/>
-            <a:ext cx="2601262" cy="1077218"/>
-          </a:xfrm>
-          <a:prstGeom prst="rect">
-            <a:avLst/>
-          </a:prstGeom>
-          <a:noFill/>
-        </p:spPr>
-        <p:txBody>
-          <a:bodyPr wrap="square" rtlCol="0">
-            <a:spAutoFit/>
-          </a:bodyPr>
-          <a:lstStyle/>
-          <a:p>
-            <a:r>
-              <a:rPr lang="en-US" sz="3200" dirty="0" smtClean="0"/>
-              <a:t>Untrusted Neighborhood</a:t>
-            </a:r>
-            <a:endParaRPr lang="en-US" sz="3200" dirty="0"/>
-          </a:p>
-        </p:txBody>
-      </p:sp>
-      <p:sp>
-        <p:nvSpPr>
-          <p:cNvPr id="81" name="TextBox 80"/>
-          <p:cNvSpPr txBox="1"/>
-          <p:nvPr/>
-        </p:nvSpPr>
-        <p:spPr>
-          <a:xfrm>
-            <a:off x="793730" y="2281023"/>
-            <a:ext cx="988171" cy="584776"/>
-          </a:xfrm>
-          <a:prstGeom prst="rect">
-            <a:avLst/>
-          </a:prstGeom>
-          <a:noFill/>
-        </p:spPr>
-        <p:txBody>
-          <a:bodyPr wrap="none" rtlCol="0">
-            <a:spAutoFit/>
-          </a:bodyPr>
-          <a:lstStyle/>
-          <a:p>
-            <a:r>
-              <a:rPr lang="en-US" sz="3200" dirty="0" smtClean="0"/>
-              <a:t>Alice</a:t>
-            </a:r>
-            <a:endParaRPr lang="en-US" sz="3200" dirty="0"/>
-          </a:p>
-        </p:txBody>
-      </p:sp>
-      <p:sp>
-        <p:nvSpPr>
-          <p:cNvPr id="43" name="Oval 42"/>
+          <a:ln>
+            <a:solidFill>
+              <a:schemeClr val="tx1"/>
+            </a:solidFill>
+            <a:prstDash val="dash"/>
+          </a:ln>
+        </p:spPr>
+        <p:style>
+          <a:lnRef idx="1">
+            <a:schemeClr val="accent1"/>
+          </a:lnRef>
+          <a:fillRef idx="3">
+            <a:schemeClr val="accent1"/>
+          </a:fillRef>
+          <a:effectRef idx="2">
+            <a:schemeClr val="accent1"/>
+          </a:effectRef>
+          <a:fontRef idx="minor">
+            <a:schemeClr val="lt1"/>
+          </a:fontRef>
+        </p:style>
+        <p:txBody>
+          <a:bodyPr rtlCol="0" anchor="ctr"/>
+          <a:lstStyle/>
+          <a:p>
+            <a:pPr algn="ctr"/>
+            <a:endParaRPr lang="en-US"/>
+          </a:p>
+        </p:txBody>
+      </p:sp>
+      <p:sp>
+        <p:nvSpPr>
+          <p:cNvPr id="383" name="Oval 382"/>
           <p:cNvSpPr/>
           <p:nvPr/>
         </p:nvSpPr>
         <p:spPr>
           <a:xfrm>
-            <a:off x="2732985" y="2231283"/>
+            <a:off x="6372004" y="2884300"/>
             <a:ext cx="352055" cy="352095"/>
           </a:xfrm>
           <a:prstGeom prst="ellipse">
@@ -4831,404 +5118,231 @@
           </a:p>
         </p:txBody>
       </p:sp>
+      <p:sp>
+        <p:nvSpPr>
+          <p:cNvPr id="384" name="Oval 383"/>
+          <p:cNvSpPr/>
+          <p:nvPr/>
+        </p:nvSpPr>
+        <p:spPr>
+          <a:xfrm>
+            <a:off x="6372004" y="2185412"/>
+            <a:ext cx="352055" cy="352095"/>
+          </a:xfrm>
+          <a:prstGeom prst="ellipse">
+            <a:avLst/>
+          </a:prstGeom>
+          <a:solidFill>
+            <a:schemeClr val="accent3">
+              <a:lumMod val="40000"/>
+              <a:lumOff val="60000"/>
+            </a:schemeClr>
+          </a:solidFill>
+          <a:ln>
+            <a:solidFill>
+              <a:schemeClr val="tx1"/>
+            </a:solidFill>
+          </a:ln>
+        </p:spPr>
+        <p:style>
+          <a:lnRef idx="1">
+            <a:schemeClr val="accent1"/>
+          </a:lnRef>
+          <a:fillRef idx="3">
+            <a:schemeClr val="accent1"/>
+          </a:fillRef>
+          <a:effectRef idx="2">
+            <a:schemeClr val="accent1"/>
+          </a:effectRef>
+          <a:fontRef idx="minor">
+            <a:schemeClr val="lt1"/>
+          </a:fontRef>
+        </p:style>
+        <p:txBody>
+          <a:bodyPr rtlCol="0" anchor="ctr"/>
+          <a:lstStyle/>
+          <a:p>
+            <a:pPr algn="ctr"/>
+            <a:endParaRPr lang="en-US">
+              <a:ln>
+                <a:solidFill>
+                  <a:srgbClr val="000000"/>
+                </a:solidFill>
+              </a:ln>
+              <a:solidFill>
+                <a:srgbClr val="000000"/>
+              </a:solidFill>
+            </a:endParaRPr>
+          </a:p>
+        </p:txBody>
+      </p:sp>
+      <p:sp>
+        <p:nvSpPr>
+          <p:cNvPr id="385" name="TextBox 384"/>
+          <p:cNvSpPr txBox="1"/>
+          <p:nvPr/>
+        </p:nvSpPr>
+        <p:spPr>
+          <a:xfrm>
+            <a:off x="7335199" y="189690"/>
+            <a:ext cx="839893" cy="584776"/>
+          </a:xfrm>
+          <a:prstGeom prst="rect">
+            <a:avLst/>
+          </a:prstGeom>
+          <a:noFill/>
+        </p:spPr>
+        <p:txBody>
+          <a:bodyPr wrap="none" rtlCol="0">
+            <a:spAutoFit/>
+          </a:bodyPr>
+          <a:lstStyle/>
+          <a:p>
+            <a:r>
+              <a:rPr lang="en-US" sz="3200" dirty="0" smtClean="0"/>
+              <a:t>Bob</a:t>
+            </a:r>
+            <a:endParaRPr lang="en-US" sz="3200" dirty="0"/>
+          </a:p>
+        </p:txBody>
+      </p:sp>
       <p:cxnSp>
         <p:nvCxnSpPr>
-          <p:cNvPr id="53" name="Straight Connector 52"/>
+          <p:cNvPr id="386" name="Straight Connector 385"/>
           <p:cNvCxnSpPr>
-            <a:endCxn id="7" idx="5"/>
+            <a:stCxn id="371" idx="2"/>
           </p:cNvCxnSpPr>
           <p:nvPr/>
         </p:nvCxnSpPr>
         <p:spPr>
-          <a:xfrm flipH="1" flipV="1">
-            <a:off x="2414348" y="2865799"/>
-            <a:ext cx="471038" cy="70935"/>
+          <a:xfrm>
+            <a:off x="626739" y="676748"/>
+            <a:ext cx="290925" cy="1944085"/>
           </a:xfrm>
           <a:prstGeom prst="line">
             <a:avLst/>
           </a:prstGeom>
-          <a:ln>
-            <a:solidFill>
-              <a:srgbClr val="000000"/>
-            </a:solidFill>
-          </a:ln>
         </p:spPr>
         <p:style>
           <a:lnRef idx="2">
-            <a:schemeClr val="accent1"/>
+            <a:schemeClr val="dk1"/>
           </a:lnRef>
           <a:fillRef idx="0">
-            <a:schemeClr val="accent1"/>
+            <a:schemeClr val="dk1"/>
           </a:fillRef>
           <a:effectRef idx="1">
-            <a:schemeClr val="accent1"/>
+            <a:schemeClr val="dk1"/>
           </a:effectRef>
           <a:fontRef idx="minor">
             <a:schemeClr val="tx1"/>
           </a:fontRef>
         </p:style>
       </p:cxnSp>
+      <p:sp>
+        <p:nvSpPr>
+          <p:cNvPr id="387" name="TextBox 386"/>
+          <p:cNvSpPr txBox="1"/>
+          <p:nvPr/>
+        </p:nvSpPr>
+        <p:spPr>
+          <a:xfrm>
+            <a:off x="4622104" y="-64096"/>
+            <a:ext cx="1815635" cy="1077218"/>
+          </a:xfrm>
+          <a:prstGeom prst="rect">
+            <a:avLst/>
+          </a:prstGeom>
+          <a:noFill/>
+        </p:spPr>
+        <p:txBody>
+          <a:bodyPr wrap="square" rtlCol="0">
+            <a:spAutoFit/>
+          </a:bodyPr>
+          <a:lstStyle/>
+          <a:p>
+            <a:pPr algn="ctr"/>
+            <a:r>
+              <a:rPr lang="en-US" sz="3200" dirty="0" smtClean="0"/>
+              <a:t>Trust</a:t>
+            </a:r>
+          </a:p>
+          <a:p>
+            <a:pPr algn="ctr"/>
+            <a:r>
+              <a:rPr lang="en-US" sz="3200" dirty="0" smtClean="0"/>
+              <a:t>Boundary</a:t>
+            </a:r>
+            <a:endParaRPr lang="en-US" sz="3200" dirty="0"/>
+          </a:p>
+        </p:txBody>
+      </p:sp>
+      <p:sp>
+        <p:nvSpPr>
+          <p:cNvPr id="388" name="TextBox 387"/>
+          <p:cNvSpPr txBox="1"/>
+          <p:nvPr/>
+        </p:nvSpPr>
+        <p:spPr>
+          <a:xfrm>
+            <a:off x="5521181" y="3830941"/>
+            <a:ext cx="2772605" cy="1077218"/>
+          </a:xfrm>
+          <a:prstGeom prst="rect">
+            <a:avLst/>
+          </a:prstGeom>
+          <a:noFill/>
+        </p:spPr>
+        <p:txBody>
+          <a:bodyPr wrap="square" rtlCol="0">
+            <a:spAutoFit/>
+          </a:bodyPr>
+          <a:lstStyle/>
+          <a:p>
+            <a:pPr algn="ctr"/>
+            <a:r>
+              <a:rPr lang="en-US" sz="3200" dirty="0" smtClean="0"/>
+              <a:t>Trusted</a:t>
+            </a:r>
+          </a:p>
+          <a:p>
+            <a:pPr algn="ctr"/>
+            <a:r>
+              <a:rPr lang="en-US" sz="3200" dirty="0" smtClean="0"/>
+              <a:t>N</a:t>
+            </a:r>
+            <a:r>
+              <a:rPr lang="en-US" sz="3200" dirty="0" smtClean="0"/>
+              <a:t>eighborhood</a:t>
+            </a:r>
+            <a:endParaRPr lang="en-US" sz="3200" dirty="0"/>
+          </a:p>
+        </p:txBody>
+      </p:sp>
       <p:cxnSp>
         <p:nvCxnSpPr>
-          <p:cNvPr id="56" name="Straight Connector 55"/>
+          <p:cNvPr id="389" name="Straight Connector 388"/>
           <p:cNvCxnSpPr>
-            <a:endCxn id="11" idx="4"/>
+            <a:stCxn id="385" idx="2"/>
           </p:cNvCxnSpPr>
           <p:nvPr/>
         </p:nvCxnSpPr>
         <p:spPr>
-          <a:xfrm flipH="1" flipV="1">
-            <a:off x="2465905" y="3520952"/>
-            <a:ext cx="267080" cy="327186"/>
+          <a:xfrm flipH="1">
+            <a:off x="7335199" y="774466"/>
+            <a:ext cx="419947" cy="1846367"/>
           </a:xfrm>
           <a:prstGeom prst="line">
             <a:avLst/>
           </a:prstGeom>
-          <a:ln>
-            <a:solidFill>
-              <a:srgbClr val="000000"/>
-            </a:solidFill>
-          </a:ln>
         </p:spPr>
         <p:style>
           <a:lnRef idx="2">
-            <a:schemeClr val="accent1"/>
-          </a:lnRef>
-          <a:fillRef idx="0">
-            <a:schemeClr val="accent1"/>
-          </a:fillRef>
-          <a:effectRef idx="1">
-            <a:schemeClr val="accent1"/>
-          </a:effectRef>
-          <a:fontRef idx="minor">
-            <a:schemeClr val="tx1"/>
-          </a:fontRef>
-        </p:style>
-      </p:cxnSp>
-      <p:cxnSp>
-        <p:nvCxnSpPr>
-          <p:cNvPr id="59" name="Straight Connector 58"/>
-          <p:cNvCxnSpPr>
-            <a:stCxn id="43" idx="5"/>
-          </p:cNvCxnSpPr>
-          <p:nvPr/>
-        </p:nvCxnSpPr>
-        <p:spPr>
-          <a:xfrm>
-            <a:off x="3033483" y="2531815"/>
-            <a:ext cx="102283" cy="404919"/>
-          </a:xfrm>
-          <a:prstGeom prst="line">
-            <a:avLst/>
-          </a:prstGeom>
-          <a:ln>
-            <a:solidFill>
-              <a:srgbClr val="000000"/>
-            </a:solidFill>
-          </a:ln>
-        </p:spPr>
-        <p:style>
-          <a:lnRef idx="2">
-            <a:schemeClr val="accent1"/>
-          </a:lnRef>
-          <a:fillRef idx="0">
-            <a:schemeClr val="accent1"/>
-          </a:fillRef>
-          <a:effectRef idx="1">
-            <a:schemeClr val="accent1"/>
-          </a:effectRef>
-          <a:fontRef idx="minor">
-            <a:schemeClr val="tx1"/>
-          </a:fontRef>
-        </p:style>
-      </p:cxnSp>
-      <p:cxnSp>
-        <p:nvCxnSpPr>
-          <p:cNvPr id="66" name="Straight Connector 65"/>
-          <p:cNvCxnSpPr>
-            <a:stCxn id="8" idx="5"/>
-          </p:cNvCxnSpPr>
-          <p:nvPr/>
-        </p:nvCxnSpPr>
-        <p:spPr>
-          <a:xfrm>
-            <a:off x="2238320" y="4024186"/>
-            <a:ext cx="647066" cy="472067"/>
-          </a:xfrm>
-          <a:prstGeom prst="line">
-            <a:avLst/>
-          </a:prstGeom>
-          <a:ln>
-            <a:solidFill>
-              <a:srgbClr val="000000"/>
-            </a:solidFill>
-          </a:ln>
-        </p:spPr>
-        <p:style>
-          <a:lnRef idx="2">
-            <a:schemeClr val="accent1"/>
-          </a:lnRef>
-          <a:fillRef idx="0">
-            <a:schemeClr val="accent1"/>
-          </a:fillRef>
-          <a:effectRef idx="1">
-            <a:schemeClr val="accent1"/>
-          </a:effectRef>
-          <a:fontRef idx="minor">
-            <a:schemeClr val="tx1"/>
-          </a:fontRef>
-        </p:style>
-      </p:cxnSp>
-      <p:cxnSp>
-        <p:nvCxnSpPr>
-          <p:cNvPr id="69" name="Straight Connector 68"/>
-          <p:cNvCxnSpPr>
-            <a:stCxn id="43" idx="6"/>
-            <a:endCxn id="10" idx="2"/>
-          </p:cNvCxnSpPr>
-          <p:nvPr/>
-        </p:nvCxnSpPr>
-        <p:spPr>
-          <a:xfrm flipV="1">
-            <a:off x="3085040" y="2383681"/>
-            <a:ext cx="892977" cy="23650"/>
-          </a:xfrm>
-          <a:prstGeom prst="line">
-            <a:avLst/>
-          </a:prstGeom>
-          <a:ln>
-            <a:solidFill>
-              <a:srgbClr val="000000"/>
-            </a:solidFill>
-          </a:ln>
-        </p:spPr>
-        <p:style>
-          <a:lnRef idx="2">
-            <a:schemeClr val="accent1"/>
-          </a:lnRef>
-          <a:fillRef idx="0">
-            <a:schemeClr val="accent1"/>
-          </a:fillRef>
-          <a:effectRef idx="1">
-            <a:schemeClr val="accent1"/>
-          </a:effectRef>
-          <a:fontRef idx="minor">
-            <a:schemeClr val="tx1"/>
-          </a:fontRef>
-        </p:style>
-      </p:cxnSp>
-      <p:cxnSp>
-        <p:nvCxnSpPr>
-          <p:cNvPr id="75" name="Straight Connector 74"/>
-          <p:cNvCxnSpPr>
-            <a:stCxn id="9" idx="0"/>
-          </p:cNvCxnSpPr>
-          <p:nvPr/>
-        </p:nvCxnSpPr>
-        <p:spPr>
-          <a:xfrm flipV="1">
-            <a:off x="5391628" y="2193557"/>
-            <a:ext cx="248009" cy="356608"/>
-          </a:xfrm>
-          <a:prstGeom prst="line">
-            <a:avLst/>
-          </a:prstGeom>
-          <a:ln>
-            <a:solidFill>
-              <a:srgbClr val="000000"/>
-            </a:solidFill>
-          </a:ln>
-        </p:spPr>
-        <p:style>
-          <a:lnRef idx="2">
-            <a:schemeClr val="accent1"/>
-          </a:lnRef>
-          <a:fillRef idx="0">
-            <a:schemeClr val="accent1"/>
-          </a:fillRef>
-          <a:effectRef idx="1">
-            <a:schemeClr val="accent1"/>
-          </a:effectRef>
-          <a:fontRef idx="minor">
-            <a:schemeClr val="tx1"/>
-          </a:fontRef>
-        </p:style>
-      </p:cxnSp>
-      <p:cxnSp>
-        <p:nvCxnSpPr>
-          <p:cNvPr id="76" name="Straight Connector 75"/>
-          <p:cNvCxnSpPr>
-            <a:stCxn id="12" idx="0"/>
-          </p:cNvCxnSpPr>
-          <p:nvPr/>
-        </p:nvCxnSpPr>
-        <p:spPr>
-          <a:xfrm flipV="1">
-            <a:off x="6103336" y="2741315"/>
-            <a:ext cx="152399" cy="317134"/>
-          </a:xfrm>
-          <a:prstGeom prst="line">
-            <a:avLst/>
-          </a:prstGeom>
-          <a:ln>
-            <a:solidFill>
-              <a:srgbClr val="000000"/>
-            </a:solidFill>
-          </a:ln>
-        </p:spPr>
-        <p:style>
-          <a:lnRef idx="2">
-            <a:schemeClr val="accent1"/>
-          </a:lnRef>
-          <a:fillRef idx="0">
-            <a:schemeClr val="accent1"/>
-          </a:fillRef>
-          <a:effectRef idx="1">
-            <a:schemeClr val="accent1"/>
-          </a:effectRef>
-          <a:fontRef idx="minor">
-            <a:schemeClr val="tx1"/>
-          </a:fontRef>
-        </p:style>
-      </p:cxnSp>
-      <p:cxnSp>
-        <p:nvCxnSpPr>
-          <p:cNvPr id="79" name="Straight Connector 78"/>
-          <p:cNvCxnSpPr>
-            <a:endCxn id="64" idx="0"/>
-          </p:cNvCxnSpPr>
-          <p:nvPr/>
-        </p:nvCxnSpPr>
-        <p:spPr>
-          <a:xfrm>
-            <a:off x="6103336" y="1961674"/>
-            <a:ext cx="328427" cy="427546"/>
-          </a:xfrm>
-          <a:prstGeom prst="line">
-            <a:avLst/>
-          </a:prstGeom>
-          <a:ln>
-            <a:solidFill>
-              <a:srgbClr val="000000"/>
-            </a:solidFill>
-          </a:ln>
-        </p:spPr>
-        <p:style>
-          <a:lnRef idx="2">
-            <a:schemeClr val="accent1"/>
-          </a:lnRef>
-          <a:fillRef idx="0">
-            <a:schemeClr val="accent1"/>
-          </a:fillRef>
-          <a:effectRef idx="1">
-            <a:schemeClr val="accent1"/>
-          </a:effectRef>
-          <a:fontRef idx="minor">
-            <a:schemeClr val="tx1"/>
-          </a:fontRef>
-        </p:style>
-      </p:cxnSp>
-      <p:cxnSp>
-        <p:nvCxnSpPr>
-          <p:cNvPr id="82" name="Straight Connector 81"/>
-          <p:cNvCxnSpPr>
-            <a:stCxn id="63" idx="4"/>
-          </p:cNvCxnSpPr>
-          <p:nvPr/>
-        </p:nvCxnSpPr>
-        <p:spPr>
-          <a:xfrm flipH="1">
-            <a:off x="6103336" y="3899701"/>
-            <a:ext cx="352055" cy="420505"/>
-          </a:xfrm>
-          <a:prstGeom prst="line">
-            <a:avLst/>
-          </a:prstGeom>
-          <a:ln>
-            <a:solidFill>
-              <a:srgbClr val="000000"/>
-            </a:solidFill>
-          </a:ln>
-        </p:spPr>
-        <p:style>
-          <a:lnRef idx="2">
-            <a:schemeClr val="accent1"/>
-          </a:lnRef>
-          <a:fillRef idx="0">
-            <a:schemeClr val="accent1"/>
-          </a:fillRef>
-          <a:effectRef idx="1">
-            <a:schemeClr val="accent1"/>
-          </a:effectRef>
-          <a:fontRef idx="minor">
-            <a:schemeClr val="tx1"/>
-          </a:fontRef>
-        </p:style>
-      </p:cxnSp>
-      <p:cxnSp>
-        <p:nvCxnSpPr>
-          <p:cNvPr id="86" name="Straight Connector 85"/>
-          <p:cNvCxnSpPr>
-            <a:stCxn id="11" idx="3"/>
-            <a:endCxn id="8" idx="7"/>
-          </p:cNvCxnSpPr>
-          <p:nvPr/>
-        </p:nvCxnSpPr>
-        <p:spPr>
-          <a:xfrm flipH="1">
-            <a:off x="2238320" y="3469389"/>
-            <a:ext cx="103114" cy="305828"/>
-          </a:xfrm>
-          <a:prstGeom prst="line">
-            <a:avLst/>
-          </a:prstGeom>
-          <a:ln>
-            <a:solidFill>
-              <a:srgbClr val="000000"/>
-            </a:solidFill>
-          </a:ln>
-        </p:spPr>
-        <p:style>
-          <a:lnRef idx="2">
-            <a:schemeClr val="accent1"/>
-          </a:lnRef>
-          <a:fillRef idx="0">
-            <a:schemeClr val="accent1"/>
-          </a:fillRef>
-          <a:effectRef idx="1">
-            <a:schemeClr val="accent1"/>
-          </a:effectRef>
-          <a:fontRef idx="minor">
-            <a:schemeClr val="tx1"/>
-          </a:fontRef>
-        </p:style>
-      </p:cxnSp>
-      <p:cxnSp>
-        <p:nvCxnSpPr>
-          <p:cNvPr id="3" name="Straight Connector 2"/>
-          <p:cNvCxnSpPr>
-            <a:stCxn id="73" idx="2"/>
-            <a:endCxn id="5" idx="0"/>
-          </p:cNvCxnSpPr>
-          <p:nvPr/>
-        </p:nvCxnSpPr>
-        <p:spPr>
-          <a:xfrm>
-            <a:off x="2465905" y="1519092"/>
-            <a:ext cx="97090" cy="205162"/>
-          </a:xfrm>
-          <a:prstGeom prst="line">
-            <a:avLst/>
-          </a:prstGeom>
-        </p:spPr>
-        <p:style>
-          <a:lnRef idx="1">
             <a:schemeClr val="dk1"/>
           </a:lnRef>
           <a:fillRef idx="0">
             <a:schemeClr val="dk1"/>
           </a:fillRef>
-          <a:effectRef idx="0">
+          <a:effectRef idx="1">
             <a:schemeClr val="dk1"/>
           </a:effectRef>
           <a:fontRef idx="minor">
@@ -5238,29 +5352,30 @@
       </p:cxnSp>
       <p:cxnSp>
         <p:nvCxnSpPr>
-          <p:cNvPr id="57" name="Straight Connector 56"/>
+          <p:cNvPr id="390" name="Straight Connector 389"/>
           <p:cNvCxnSpPr>
-            <a:stCxn id="61" idx="4"/>
+            <a:stCxn id="370" idx="0"/>
+            <a:endCxn id="367" idx="4"/>
           </p:cNvCxnSpPr>
           <p:nvPr/>
         </p:nvCxnSpPr>
         <p:spPr>
-          <a:xfrm>
-            <a:off x="4126304" y="4961521"/>
-            <a:ext cx="27741" cy="399913"/>
+          <a:xfrm flipV="1">
+            <a:off x="4103935" y="4369552"/>
+            <a:ext cx="4968" cy="241967"/>
           </a:xfrm>
           <a:prstGeom prst="line">
             <a:avLst/>
           </a:prstGeom>
         </p:spPr>
         <p:style>
-          <a:lnRef idx="1">
+          <a:lnRef idx="2">
             <a:schemeClr val="dk1"/>
           </a:lnRef>
           <a:fillRef idx="0">
             <a:schemeClr val="dk1"/>
           </a:fillRef>
-          <a:effectRef idx="0">
+          <a:effectRef idx="1">
             <a:schemeClr val="dk1"/>
           </a:effectRef>
           <a:fontRef idx="minor">
@@ -5270,29 +5385,129 @@
       </p:cxnSp>
       <p:cxnSp>
         <p:nvCxnSpPr>
-          <p:cNvPr id="60" name="Straight Connector 59"/>
+          <p:cNvPr id="391" name="Straight Connector 390"/>
           <p:cNvCxnSpPr>
-            <a:endCxn id="62" idx="0"/>
+            <a:stCxn id="368" idx="2"/>
+            <a:endCxn id="366" idx="0"/>
           </p:cNvCxnSpPr>
           <p:nvPr/>
         </p:nvCxnSpPr>
         <p:spPr>
           <a:xfrm>
-            <a:off x="5850104" y="1519092"/>
-            <a:ext cx="0" cy="195747"/>
+            <a:off x="2732752" y="1013122"/>
+            <a:ext cx="332968" cy="666310"/>
           </a:xfrm>
           <a:prstGeom prst="line">
             <a:avLst/>
           </a:prstGeom>
         </p:spPr>
         <p:style>
-          <a:lnRef idx="1">
+          <a:lnRef idx="2">
             <a:schemeClr val="dk1"/>
           </a:lnRef>
           <a:fillRef idx="0">
             <a:schemeClr val="dk1"/>
           </a:fillRef>
-          <a:effectRef idx="0">
+          <a:effectRef idx="1">
+            <a:schemeClr val="dk1"/>
+          </a:effectRef>
+          <a:fontRef idx="minor">
+            <a:schemeClr val="tx1"/>
+          </a:fontRef>
+        </p:style>
+      </p:cxnSp>
+      <p:cxnSp>
+        <p:nvCxnSpPr>
+          <p:cNvPr id="392" name="Straight Connector 391"/>
+          <p:cNvCxnSpPr>
+            <a:stCxn id="387" idx="2"/>
+            <a:endCxn id="380" idx="0"/>
+          </p:cNvCxnSpPr>
+          <p:nvPr/>
+        </p:nvCxnSpPr>
+        <p:spPr>
+          <a:xfrm flipH="1">
+            <a:off x="5101243" y="1013122"/>
+            <a:ext cx="428679" cy="678550"/>
+          </a:xfrm>
+          <a:prstGeom prst="line">
+            <a:avLst/>
+          </a:prstGeom>
+        </p:spPr>
+        <p:style>
+          <a:lnRef idx="2">
+            <a:schemeClr val="dk1"/>
+          </a:lnRef>
+          <a:fillRef idx="0">
+            <a:schemeClr val="dk1"/>
+          </a:fillRef>
+          <a:effectRef idx="1">
+            <a:schemeClr val="dk1"/>
+          </a:effectRef>
+          <a:fontRef idx="minor">
+            <a:schemeClr val="tx1"/>
+          </a:fontRef>
+        </p:style>
+      </p:cxnSp>
+      <p:cxnSp>
+        <p:nvCxnSpPr>
+          <p:cNvPr id="393" name="Straight Connector 392"/>
+          <p:cNvCxnSpPr>
+            <a:stCxn id="359" idx="4"/>
+            <a:endCxn id="369" idx="0"/>
+          </p:cNvCxnSpPr>
+          <p:nvPr/>
+        </p:nvCxnSpPr>
+        <p:spPr>
+          <a:xfrm>
+            <a:off x="1299756" y="3576250"/>
+            <a:ext cx="6171" cy="254691"/>
+          </a:xfrm>
+          <a:prstGeom prst="line">
+            <a:avLst/>
+          </a:prstGeom>
+        </p:spPr>
+        <p:style>
+          <a:lnRef idx="2">
+            <a:schemeClr val="dk1"/>
+          </a:lnRef>
+          <a:fillRef idx="0">
+            <a:schemeClr val="dk1"/>
+          </a:fillRef>
+          <a:effectRef idx="1">
+            <a:schemeClr val="dk1"/>
+          </a:effectRef>
+          <a:fontRef idx="minor">
+            <a:schemeClr val="tx1"/>
+          </a:fontRef>
+        </p:style>
+      </p:cxnSp>
+      <p:cxnSp>
+        <p:nvCxnSpPr>
+          <p:cNvPr id="394" name="Straight Connector 393"/>
+          <p:cNvCxnSpPr>
+            <a:stCxn id="382" idx="4"/>
+            <a:endCxn id="388" idx="0"/>
+          </p:cNvCxnSpPr>
+          <p:nvPr/>
+        </p:nvCxnSpPr>
+        <p:spPr>
+          <a:xfrm>
+            <a:off x="6902991" y="3588490"/>
+            <a:ext cx="4493" cy="242451"/>
+          </a:xfrm>
+          <a:prstGeom prst="line">
+            <a:avLst/>
+          </a:prstGeom>
+        </p:spPr>
+        <p:style>
+          <a:lnRef idx="2">
+            <a:schemeClr val="dk1"/>
+          </a:lnRef>
+          <a:fillRef idx="0">
+            <a:schemeClr val="dk1"/>
+          </a:fillRef>
+          <a:effectRef idx="1">
             <a:schemeClr val="dk1"/>
           </a:effectRef>
           <a:fontRef idx="minor">

</xml_diff>